<commit_message>
all powerpoint drawings in one file now
</commit_message>
<xml_diff>
--- a/Physikalismus.pptx
+++ b/Physikalismus.pptx
@@ -11,6 +11,8 @@
     <p:sldId id="259" r:id="rId5"/>
     <p:sldId id="260" r:id="rId6"/>
     <p:sldId id="261" r:id="rId7"/>
+    <p:sldId id="262" r:id="rId8"/>
+    <p:sldId id="263" r:id="rId9"/>
   </p:sldIdLst>
   <p:sldSz cx="9144000" cy="6858000" type="screen4x3"/>
   <p:notesSz cx="6858000" cy="9144000"/>
@@ -293,7 +295,7 @@
           <a:p>
             <a:fld id="{8EAC6BE9-FF5B-4ADD-9934-8E43C44DF95B}" type="datetimeFigureOut">
               <a:rPr lang="de-DE" smtClean="0"/>
-              <a:t>06.07.2015</a:t>
+              <a:t>26.09.2016</a:t>
             </a:fld>
             <a:endParaRPr lang="de-DE"/>
           </a:p>
@@ -463,7 +465,7 @@
           <a:p>
             <a:fld id="{8EAC6BE9-FF5B-4ADD-9934-8E43C44DF95B}" type="datetimeFigureOut">
               <a:rPr lang="de-DE" smtClean="0"/>
-              <a:t>06.07.2015</a:t>
+              <a:t>26.09.2016</a:t>
             </a:fld>
             <a:endParaRPr lang="de-DE"/>
           </a:p>
@@ -643,7 +645,7 @@
           <a:p>
             <a:fld id="{8EAC6BE9-FF5B-4ADD-9934-8E43C44DF95B}" type="datetimeFigureOut">
               <a:rPr lang="de-DE" smtClean="0"/>
-              <a:t>06.07.2015</a:t>
+              <a:t>26.09.2016</a:t>
             </a:fld>
             <a:endParaRPr lang="de-DE"/>
           </a:p>
@@ -813,7 +815,7 @@
           <a:p>
             <a:fld id="{8EAC6BE9-FF5B-4ADD-9934-8E43C44DF95B}" type="datetimeFigureOut">
               <a:rPr lang="de-DE" smtClean="0"/>
-              <a:t>06.07.2015</a:t>
+              <a:t>26.09.2016</a:t>
             </a:fld>
             <a:endParaRPr lang="de-DE"/>
           </a:p>
@@ -1059,7 +1061,7 @@
           <a:p>
             <a:fld id="{8EAC6BE9-FF5B-4ADD-9934-8E43C44DF95B}" type="datetimeFigureOut">
               <a:rPr lang="de-DE" smtClean="0"/>
-              <a:t>06.07.2015</a:t>
+              <a:t>26.09.2016</a:t>
             </a:fld>
             <a:endParaRPr lang="de-DE"/>
           </a:p>
@@ -1347,7 +1349,7 @@
           <a:p>
             <a:fld id="{8EAC6BE9-FF5B-4ADD-9934-8E43C44DF95B}" type="datetimeFigureOut">
               <a:rPr lang="de-DE" smtClean="0"/>
-              <a:t>06.07.2015</a:t>
+              <a:t>26.09.2016</a:t>
             </a:fld>
             <a:endParaRPr lang="de-DE"/>
           </a:p>
@@ -1769,7 +1771,7 @@
           <a:p>
             <a:fld id="{8EAC6BE9-FF5B-4ADD-9934-8E43C44DF95B}" type="datetimeFigureOut">
               <a:rPr lang="de-DE" smtClean="0"/>
-              <a:t>06.07.2015</a:t>
+              <a:t>26.09.2016</a:t>
             </a:fld>
             <a:endParaRPr lang="de-DE"/>
           </a:p>
@@ -1887,7 +1889,7 @@
           <a:p>
             <a:fld id="{8EAC6BE9-FF5B-4ADD-9934-8E43C44DF95B}" type="datetimeFigureOut">
               <a:rPr lang="de-DE" smtClean="0"/>
-              <a:t>06.07.2015</a:t>
+              <a:t>26.09.2016</a:t>
             </a:fld>
             <a:endParaRPr lang="de-DE"/>
           </a:p>
@@ -1982,7 +1984,7 @@
           <a:p>
             <a:fld id="{8EAC6BE9-FF5B-4ADD-9934-8E43C44DF95B}" type="datetimeFigureOut">
               <a:rPr lang="de-DE" smtClean="0"/>
-              <a:t>06.07.2015</a:t>
+              <a:t>26.09.2016</a:t>
             </a:fld>
             <a:endParaRPr lang="de-DE"/>
           </a:p>
@@ -2259,7 +2261,7 @@
           <a:p>
             <a:fld id="{8EAC6BE9-FF5B-4ADD-9934-8E43C44DF95B}" type="datetimeFigureOut">
               <a:rPr lang="de-DE" smtClean="0"/>
-              <a:t>06.07.2015</a:t>
+              <a:t>26.09.2016</a:t>
             </a:fld>
             <a:endParaRPr lang="de-DE"/>
           </a:p>
@@ -2512,7 +2514,7 @@
           <a:p>
             <a:fld id="{8EAC6BE9-FF5B-4ADD-9934-8E43C44DF95B}" type="datetimeFigureOut">
               <a:rPr lang="de-DE" smtClean="0"/>
-              <a:t>06.07.2015</a:t>
+              <a:t>26.09.2016</a:t>
             </a:fld>
             <a:endParaRPr lang="de-DE"/>
           </a:p>
@@ -2725,7 +2727,7 @@
           <a:p>
             <a:fld id="{8EAC6BE9-FF5B-4ADD-9934-8E43C44DF95B}" type="datetimeFigureOut">
               <a:rPr lang="de-DE" smtClean="0"/>
-              <a:t>06.07.2015</a:t>
+              <a:t>26.09.2016</a:t>
             </a:fld>
             <a:endParaRPr lang="de-DE"/>
           </a:p>
@@ -6577,6 +6579,720 @@
 </p:sld>
 </file>
 
+<file path=ppt/slides/slide7.xml><?xml version="1.0" encoding="utf-8"?>
+<p:sld xmlns:a="http://schemas.openxmlformats.org/drawingml/2006/main" xmlns:r="http://schemas.openxmlformats.org/officeDocument/2006/relationships" xmlns:p="http://schemas.openxmlformats.org/presentationml/2006/main">
+  <p:cSld>
+    <p:spTree>
+      <p:nvGrpSpPr>
+        <p:cNvPr id="1" name=""/>
+        <p:cNvGrpSpPr/>
+        <p:nvPr/>
+      </p:nvGrpSpPr>
+      <p:grpSpPr>
+        <a:xfrm>
+          <a:off x="0" y="0"/>
+          <a:ext cx="0" cy="0"/>
+          <a:chOff x="0" y="0"/>
+          <a:chExt cx="0" cy="0"/>
+        </a:xfrm>
+      </p:grpSpPr>
+      <p:sp>
+        <p:nvSpPr>
+          <p:cNvPr id="4" name="Ellipse 3"/>
+          <p:cNvSpPr/>
+          <p:nvPr/>
+        </p:nvSpPr>
+        <p:spPr>
+          <a:xfrm>
+            <a:off x="3059832" y="2420888"/>
+            <a:ext cx="2592288" cy="2592288"/>
+          </a:xfrm>
+          <a:prstGeom prst="ellipse">
+            <a:avLst/>
+          </a:prstGeom>
+          <a:noFill/>
+          <a:ln>
+            <a:prstDash val="lgDash"/>
+          </a:ln>
+        </p:spPr>
+        <p:style>
+          <a:lnRef idx="2">
+            <a:schemeClr val="accent1">
+              <a:shade val="50000"/>
+            </a:schemeClr>
+          </a:lnRef>
+          <a:fillRef idx="1">
+            <a:schemeClr val="accent1"/>
+          </a:fillRef>
+          <a:effectRef idx="0">
+            <a:schemeClr val="accent1"/>
+          </a:effectRef>
+          <a:fontRef idx="minor">
+            <a:schemeClr val="lt1"/>
+          </a:fontRef>
+        </p:style>
+        <p:txBody>
+          <a:bodyPr rtlCol="0" anchor="ctr"/>
+          <a:lstStyle/>
+          <a:p>
+            <a:pPr algn="ctr"/>
+            <a:endParaRPr lang="de-DE"/>
+          </a:p>
+        </p:txBody>
+      </p:sp>
+      <p:cxnSp>
+        <p:nvCxnSpPr>
+          <p:cNvPr id="5" name="Gerade Verbindung mit Pfeil 4"/>
+          <p:cNvCxnSpPr>
+            <a:stCxn id="4" idx="0"/>
+          </p:cNvCxnSpPr>
+          <p:nvPr/>
+        </p:nvCxnSpPr>
+        <p:spPr>
+          <a:xfrm>
+            <a:off x="4355976" y="2420888"/>
+            <a:ext cx="1296144" cy="0"/>
+          </a:xfrm>
+          <a:prstGeom prst="straightConnector1">
+            <a:avLst/>
+          </a:prstGeom>
+          <a:ln w="28575">
+            <a:headEnd type="oval" w="lg" len="lg"/>
+            <a:tailEnd type="triangle" w="lg" len="lg"/>
+          </a:ln>
+        </p:spPr>
+        <p:style>
+          <a:lnRef idx="1">
+            <a:schemeClr val="accent1"/>
+          </a:lnRef>
+          <a:fillRef idx="0">
+            <a:schemeClr val="accent1"/>
+          </a:fillRef>
+          <a:effectRef idx="0">
+            <a:schemeClr val="accent1"/>
+          </a:effectRef>
+          <a:fontRef idx="minor">
+            <a:schemeClr val="tx1"/>
+          </a:fontRef>
+        </p:style>
+      </p:cxnSp>
+      <p:cxnSp>
+        <p:nvCxnSpPr>
+          <p:cNvPr id="6" name="Gerade Verbindung mit Pfeil 5"/>
+          <p:cNvCxnSpPr>
+            <a:endCxn id="4" idx="4"/>
+          </p:cNvCxnSpPr>
+          <p:nvPr/>
+        </p:nvCxnSpPr>
+        <p:spPr>
+          <a:xfrm>
+            <a:off x="3062389" y="5013176"/>
+            <a:ext cx="1293587" cy="0"/>
+          </a:xfrm>
+          <a:prstGeom prst="straightConnector1">
+            <a:avLst/>
+          </a:prstGeom>
+          <a:ln w="28575">
+            <a:headEnd type="triangle" w="lg" len="lg"/>
+            <a:tailEnd type="oval" w="lg" len="lg"/>
+          </a:ln>
+        </p:spPr>
+        <p:style>
+          <a:lnRef idx="1">
+            <a:schemeClr val="accent1"/>
+          </a:lnRef>
+          <a:fillRef idx="0">
+            <a:schemeClr val="accent1"/>
+          </a:fillRef>
+          <a:effectRef idx="0">
+            <a:schemeClr val="accent1"/>
+          </a:effectRef>
+          <a:fontRef idx="minor">
+            <a:schemeClr val="tx1"/>
+          </a:fontRef>
+        </p:style>
+      </p:cxnSp>
+      <p:sp>
+        <p:nvSpPr>
+          <p:cNvPr id="7" name="Ellipse 6"/>
+          <p:cNvSpPr/>
+          <p:nvPr/>
+        </p:nvSpPr>
+        <p:spPr>
+          <a:xfrm>
+            <a:off x="4324803" y="3685859"/>
+            <a:ext cx="72008" cy="72008"/>
+          </a:xfrm>
+          <a:prstGeom prst="ellipse">
+            <a:avLst/>
+          </a:prstGeom>
+        </p:spPr>
+        <p:style>
+          <a:lnRef idx="2">
+            <a:schemeClr val="accent1">
+              <a:shade val="50000"/>
+            </a:schemeClr>
+          </a:lnRef>
+          <a:fillRef idx="1">
+            <a:schemeClr val="accent1"/>
+          </a:fillRef>
+          <a:effectRef idx="0">
+            <a:schemeClr val="accent1"/>
+          </a:effectRef>
+          <a:fontRef idx="minor">
+            <a:schemeClr val="lt1"/>
+          </a:fontRef>
+        </p:style>
+        <p:txBody>
+          <a:bodyPr rtlCol="0" anchor="ctr"/>
+          <a:lstStyle/>
+          <a:p>
+            <a:pPr algn="ctr"/>
+            <a:endParaRPr lang="de-DE"/>
+          </a:p>
+        </p:txBody>
+      </p:sp>
+      <p:sp>
+        <p:nvSpPr>
+          <p:cNvPr id="8" name="Textfeld 7"/>
+          <p:cNvSpPr txBox="1"/>
+          <p:nvPr/>
+        </p:nvSpPr>
+        <p:spPr>
+          <a:xfrm>
+            <a:off x="4063908" y="3501008"/>
+            <a:ext cx="292068" cy="369332"/>
+          </a:xfrm>
+          <a:prstGeom prst="rect">
+            <a:avLst/>
+          </a:prstGeom>
+          <a:noFill/>
+        </p:spPr>
+        <p:txBody>
+          <a:bodyPr wrap="none" rtlCol="0">
+            <a:spAutoFit/>
+          </a:bodyPr>
+          <a:lstStyle/>
+          <a:p>
+            <a:r>
+              <a:rPr lang="de-DE" smtClean="0"/>
+              <a:t>Z</a:t>
+            </a:r>
+            <a:endParaRPr lang="de-DE"/>
+          </a:p>
+        </p:txBody>
+      </p:sp>
+      <p:sp>
+        <p:nvSpPr>
+          <p:cNvPr id="9" name="Textfeld 8"/>
+          <p:cNvSpPr txBox="1"/>
+          <p:nvPr/>
+        </p:nvSpPr>
+        <p:spPr>
+          <a:xfrm>
+            <a:off x="4188688" y="2420888"/>
+            <a:ext cx="311304" cy="369332"/>
+          </a:xfrm>
+          <a:prstGeom prst="rect">
+            <a:avLst/>
+          </a:prstGeom>
+          <a:noFill/>
+        </p:spPr>
+        <p:txBody>
+          <a:bodyPr wrap="none" rtlCol="0">
+            <a:spAutoFit/>
+          </a:bodyPr>
+          <a:lstStyle/>
+          <a:p>
+            <a:r>
+              <a:rPr lang="el-GR" smtClean="0"/>
+              <a:t>μ</a:t>
+            </a:r>
+            <a:endParaRPr lang="de-DE"/>
+          </a:p>
+        </p:txBody>
+      </p:sp>
+      <p:sp>
+        <p:nvSpPr>
+          <p:cNvPr id="10" name="Textfeld 9"/>
+          <p:cNvSpPr txBox="1"/>
+          <p:nvPr/>
+        </p:nvSpPr>
+        <p:spPr>
+          <a:xfrm>
+            <a:off x="4211960" y="4581128"/>
+            <a:ext cx="311304" cy="369332"/>
+          </a:xfrm>
+          <a:prstGeom prst="rect">
+            <a:avLst/>
+          </a:prstGeom>
+          <a:noFill/>
+        </p:spPr>
+        <p:txBody>
+          <a:bodyPr wrap="none" rtlCol="0">
+            <a:spAutoFit/>
+          </a:bodyPr>
+          <a:lstStyle/>
+          <a:p>
+            <a:r>
+              <a:rPr lang="el-GR" smtClean="0"/>
+              <a:t>μ</a:t>
+            </a:r>
+            <a:endParaRPr lang="de-DE"/>
+          </a:p>
+        </p:txBody>
+      </p:sp>
+      <p:sp>
+        <p:nvSpPr>
+          <p:cNvPr id="11" name="Textfeld 10"/>
+          <p:cNvSpPr txBox="1"/>
+          <p:nvPr/>
+        </p:nvSpPr>
+        <p:spPr>
+          <a:xfrm>
+            <a:off x="5196800" y="1988840"/>
+            <a:ext cx="478016" cy="369332"/>
+          </a:xfrm>
+          <a:prstGeom prst="rect">
+            <a:avLst/>
+          </a:prstGeom>
+          <a:noFill/>
+        </p:spPr>
+        <p:txBody>
+          <a:bodyPr wrap="none" rtlCol="0">
+            <a:spAutoFit/>
+          </a:bodyPr>
+          <a:lstStyle/>
+          <a:p>
+            <a:r>
+              <a:rPr lang="de-DE" smtClean="0"/>
+              <a:t>v</a:t>
+            </a:r>
+            <a:r>
+              <a:rPr lang="de-DE" baseline="30000" smtClean="0"/>
+              <a:t>(1)</a:t>
+            </a:r>
+            <a:endParaRPr lang="de-DE" baseline="30000"/>
+          </a:p>
+        </p:txBody>
+      </p:sp>
+      <p:sp>
+        <p:nvSpPr>
+          <p:cNvPr id="12" name="Textfeld 11"/>
+          <p:cNvSpPr txBox="1"/>
+          <p:nvPr/>
+        </p:nvSpPr>
+        <p:spPr>
+          <a:xfrm>
+            <a:off x="3131840" y="5003884"/>
+            <a:ext cx="478016" cy="369332"/>
+          </a:xfrm>
+          <a:prstGeom prst="rect">
+            <a:avLst/>
+          </a:prstGeom>
+          <a:noFill/>
+        </p:spPr>
+        <p:txBody>
+          <a:bodyPr wrap="none" rtlCol="0">
+            <a:spAutoFit/>
+          </a:bodyPr>
+          <a:lstStyle/>
+          <a:p>
+            <a:r>
+              <a:rPr lang="de-DE" smtClean="0"/>
+              <a:t>v</a:t>
+            </a:r>
+            <a:r>
+              <a:rPr lang="de-DE" baseline="30000" smtClean="0"/>
+              <a:t>(2)</a:t>
+            </a:r>
+            <a:endParaRPr lang="de-DE" baseline="30000"/>
+          </a:p>
+        </p:txBody>
+      </p:sp>
+    </p:spTree>
+    <p:extLst>
+      <p:ext uri="{BB962C8B-B14F-4D97-AF65-F5344CB8AC3E}">
+        <p14:creationId xmlns:p14="http://schemas.microsoft.com/office/powerpoint/2010/main" val="3200388305"/>
+      </p:ext>
+    </p:extLst>
+  </p:cSld>
+  <p:clrMapOvr>
+    <a:masterClrMapping/>
+  </p:clrMapOvr>
+</p:sld>
+</file>
+
+<file path=ppt/slides/slide8.xml><?xml version="1.0" encoding="utf-8"?>
+<p:sld xmlns:a="http://schemas.openxmlformats.org/drawingml/2006/main" xmlns:r="http://schemas.openxmlformats.org/officeDocument/2006/relationships" xmlns:p="http://schemas.openxmlformats.org/presentationml/2006/main">
+  <p:cSld>
+    <p:spTree>
+      <p:nvGrpSpPr>
+        <p:cNvPr id="1" name=""/>
+        <p:cNvGrpSpPr/>
+        <p:nvPr/>
+      </p:nvGrpSpPr>
+      <p:grpSpPr>
+        <a:xfrm>
+          <a:off x="0" y="0"/>
+          <a:ext cx="0" cy="0"/>
+          <a:chOff x="0" y="0"/>
+          <a:chExt cx="0" cy="0"/>
+        </a:xfrm>
+      </p:grpSpPr>
+      <p:sp>
+        <p:nvSpPr>
+          <p:cNvPr id="5" name="Flussdiagramm: Verbindungsstelle 4"/>
+          <p:cNvSpPr/>
+          <p:nvPr/>
+        </p:nvSpPr>
+        <p:spPr>
+          <a:xfrm>
+            <a:off x="2483768" y="1340768"/>
+            <a:ext cx="4320000" cy="4320000"/>
+          </a:xfrm>
+          <a:prstGeom prst="flowChartConnector">
+            <a:avLst/>
+          </a:prstGeom>
+          <a:solidFill>
+            <a:schemeClr val="bg1"/>
+          </a:solidFill>
+        </p:spPr>
+        <p:style>
+          <a:lnRef idx="2">
+            <a:schemeClr val="accent1">
+              <a:shade val="50000"/>
+            </a:schemeClr>
+          </a:lnRef>
+          <a:fillRef idx="1">
+            <a:schemeClr val="accent1"/>
+          </a:fillRef>
+          <a:effectRef idx="0">
+            <a:schemeClr val="accent1"/>
+          </a:effectRef>
+          <a:fontRef idx="minor">
+            <a:schemeClr val="lt1"/>
+          </a:fontRef>
+        </p:style>
+        <p:txBody>
+          <a:bodyPr rtlCol="0" anchor="ctr"/>
+          <a:lstStyle/>
+          <a:p>
+            <a:pPr algn="ctr"/>
+            <a:endParaRPr lang="de-DE"/>
+          </a:p>
+        </p:txBody>
+      </p:sp>
+      <p:sp>
+        <p:nvSpPr>
+          <p:cNvPr id="6" name="Kreis 5"/>
+          <p:cNvSpPr/>
+          <p:nvPr/>
+        </p:nvSpPr>
+        <p:spPr>
+          <a:xfrm>
+            <a:off x="2483768" y="1340768"/>
+            <a:ext cx="4320000" cy="4320000"/>
+          </a:xfrm>
+          <a:prstGeom prst="pie">
+            <a:avLst>
+              <a:gd name="adj1" fmla="val 5388994"/>
+              <a:gd name="adj2" fmla="val 16200000"/>
+            </a:avLst>
+          </a:prstGeom>
+        </p:spPr>
+        <p:style>
+          <a:lnRef idx="2">
+            <a:schemeClr val="accent1">
+              <a:shade val="50000"/>
+            </a:schemeClr>
+          </a:lnRef>
+          <a:fillRef idx="1">
+            <a:schemeClr val="accent1"/>
+          </a:fillRef>
+          <a:effectRef idx="0">
+            <a:schemeClr val="accent1"/>
+          </a:effectRef>
+          <a:fontRef idx="minor">
+            <a:schemeClr val="lt1"/>
+          </a:fontRef>
+        </p:style>
+        <p:txBody>
+          <a:bodyPr rtlCol="0" anchor="ctr"/>
+          <a:lstStyle/>
+          <a:p>
+            <a:pPr algn="ctr"/>
+            <a:endParaRPr lang="de-DE">
+              <a:solidFill>
+                <a:schemeClr val="tx1"/>
+              </a:solidFill>
+            </a:endParaRPr>
+          </a:p>
+        </p:txBody>
+      </p:sp>
+      <p:sp>
+        <p:nvSpPr>
+          <p:cNvPr id="7" name="Titel 1"/>
+          <p:cNvSpPr txBox="1">
+            <a:spLocks/>
+          </p:cNvSpPr>
+          <p:nvPr/>
+        </p:nvSpPr>
+        <p:spPr>
+          <a:xfrm>
+            <a:off x="3923928" y="413792"/>
+            <a:ext cx="1306488" cy="1143000"/>
+          </a:xfrm>
+          <a:prstGeom prst="rect">
+            <a:avLst/>
+          </a:prstGeom>
+        </p:spPr>
+        <p:txBody>
+          <a:bodyPr vert="horz" lIns="91440" tIns="45720" rIns="91440" bIns="45720" rtlCol="0" anchor="ctr">
+            <a:normAutofit/>
+          </a:bodyPr>
+          <a:lstStyle>
+            <a:lvl1pPr algn="ctr" defTabSz="914400" rtl="0" eaLnBrk="1" latinLnBrk="0" hangingPunct="1">
+              <a:spcBef>
+                <a:spcPct val="0"/>
+              </a:spcBef>
+              <a:buNone/>
+              <a:defRPr sz="4400" kern="1200">
+                <a:solidFill>
+                  <a:schemeClr val="tx1"/>
+                </a:solidFill>
+                <a:latin typeface="+mj-lt"/>
+                <a:ea typeface="+mj-ea"/>
+                <a:cs typeface="+mj-cs"/>
+              </a:defRPr>
+            </a:lvl1pPr>
+          </a:lstStyle>
+          <a:p>
+            <a:pPr algn="r"/>
+            <a:r>
+              <a:rPr lang="de-DE" smtClean="0"/>
+              <a:t>Welt</a:t>
+            </a:r>
+            <a:endParaRPr lang="de-DE" dirty="0"/>
+          </a:p>
+        </p:txBody>
+      </p:sp>
+      <p:sp>
+        <p:nvSpPr>
+          <p:cNvPr id="8" name="Titel 1"/>
+          <p:cNvSpPr txBox="1">
+            <a:spLocks/>
+          </p:cNvSpPr>
+          <p:nvPr/>
+        </p:nvSpPr>
+        <p:spPr>
+          <a:xfrm>
+            <a:off x="3697560" y="1700808"/>
+            <a:ext cx="514400" cy="1143000"/>
+          </a:xfrm>
+          <a:prstGeom prst="rect">
+            <a:avLst/>
+          </a:prstGeom>
+        </p:spPr>
+        <p:txBody>
+          <a:bodyPr vert="horz" lIns="91440" tIns="45720" rIns="91440" bIns="45720" rtlCol="0" anchor="ctr">
+            <a:normAutofit/>
+          </a:bodyPr>
+          <a:lstStyle>
+            <a:lvl1pPr algn="ctr" defTabSz="914400" rtl="0" eaLnBrk="1" latinLnBrk="0" hangingPunct="1">
+              <a:spcBef>
+                <a:spcPct val="0"/>
+              </a:spcBef>
+              <a:buNone/>
+              <a:defRPr sz="4400" kern="1200">
+                <a:solidFill>
+                  <a:schemeClr val="tx1"/>
+                </a:solidFill>
+                <a:latin typeface="+mj-lt"/>
+                <a:ea typeface="+mj-ea"/>
+                <a:cs typeface="+mj-cs"/>
+              </a:defRPr>
+            </a:lvl1pPr>
+          </a:lstStyle>
+          <a:p>
+            <a:pPr algn="r"/>
+            <a:r>
+              <a:rPr lang="de-DE" smtClean="0">
+                <a:solidFill>
+                  <a:schemeClr val="bg1"/>
+                </a:solidFill>
+              </a:rPr>
+              <a:t>A</a:t>
+            </a:r>
+            <a:endParaRPr lang="de-DE" dirty="0">
+              <a:solidFill>
+                <a:schemeClr val="bg1"/>
+              </a:solidFill>
+            </a:endParaRPr>
+          </a:p>
+        </p:txBody>
+      </p:sp>
+      <p:sp>
+        <p:nvSpPr>
+          <p:cNvPr id="9" name="Titel 1"/>
+          <p:cNvSpPr txBox="1">
+            <a:spLocks/>
+          </p:cNvSpPr>
+          <p:nvPr/>
+        </p:nvSpPr>
+        <p:spPr>
+          <a:xfrm>
+            <a:off x="5065712" y="4230216"/>
+            <a:ext cx="514400" cy="1143000"/>
+          </a:xfrm>
+          <a:prstGeom prst="rect">
+            <a:avLst/>
+          </a:prstGeom>
+        </p:spPr>
+        <p:txBody>
+          <a:bodyPr vert="horz" lIns="91440" tIns="45720" rIns="91440" bIns="45720" rtlCol="0" anchor="ctr">
+            <a:normAutofit/>
+          </a:bodyPr>
+          <a:lstStyle>
+            <a:lvl1pPr algn="ctr" defTabSz="914400" rtl="0" eaLnBrk="1" latinLnBrk="0" hangingPunct="1">
+              <a:spcBef>
+                <a:spcPct val="0"/>
+              </a:spcBef>
+              <a:buNone/>
+              <a:defRPr sz="4400" kern="1200">
+                <a:solidFill>
+                  <a:schemeClr val="tx1"/>
+                </a:solidFill>
+                <a:latin typeface="+mj-lt"/>
+                <a:ea typeface="+mj-ea"/>
+                <a:cs typeface="+mj-cs"/>
+              </a:defRPr>
+            </a:lvl1pPr>
+          </a:lstStyle>
+          <a:p>
+            <a:pPr algn="r"/>
+            <a:r>
+              <a:rPr lang="de-DE">
+                <a:solidFill>
+                  <a:schemeClr val="accent5">
+                    <a:lumMod val="75000"/>
+                  </a:schemeClr>
+                </a:solidFill>
+              </a:rPr>
+              <a:t>B</a:t>
+            </a:r>
+            <a:endParaRPr lang="de-DE" dirty="0">
+              <a:solidFill>
+                <a:schemeClr val="accent5">
+                  <a:lumMod val="75000"/>
+                </a:schemeClr>
+              </a:solidFill>
+            </a:endParaRPr>
+          </a:p>
+        </p:txBody>
+      </p:sp>
+      <p:sp>
+        <p:nvSpPr>
+          <p:cNvPr id="10" name="Ellipse 9"/>
+          <p:cNvSpPr/>
+          <p:nvPr/>
+        </p:nvSpPr>
+        <p:spPr>
+          <a:xfrm>
+            <a:off x="5076056" y="2843808"/>
+            <a:ext cx="1512168" cy="1073274"/>
+          </a:xfrm>
+          <a:prstGeom prst="ellipse">
+            <a:avLst/>
+          </a:prstGeom>
+        </p:spPr>
+        <p:style>
+          <a:lnRef idx="2">
+            <a:schemeClr val="accent1">
+              <a:shade val="50000"/>
+            </a:schemeClr>
+          </a:lnRef>
+          <a:fillRef idx="1">
+            <a:schemeClr val="accent1"/>
+          </a:fillRef>
+          <a:effectRef idx="0">
+            <a:schemeClr val="accent1"/>
+          </a:effectRef>
+          <a:fontRef idx="minor">
+            <a:schemeClr val="lt1"/>
+          </a:fontRef>
+        </p:style>
+        <p:txBody>
+          <a:bodyPr rtlCol="0" anchor="ctr"/>
+          <a:lstStyle/>
+          <a:p>
+            <a:pPr algn="ctr"/>
+            <a:r>
+              <a:rPr lang="de-DE" smtClean="0"/>
+              <a:t>Bewusst-</a:t>
+            </a:r>
+          </a:p>
+          <a:p>
+            <a:pPr algn="ctr"/>
+            <a:r>
+              <a:rPr lang="de-DE" smtClean="0"/>
+              <a:t>sein</a:t>
+            </a:r>
+            <a:endParaRPr lang="de-DE" dirty="0"/>
+          </a:p>
+        </p:txBody>
+      </p:sp>
+      <p:cxnSp>
+        <p:nvCxnSpPr>
+          <p:cNvPr id="11" name="Gekrümmte Verbindung 10"/>
+          <p:cNvCxnSpPr>
+            <a:stCxn id="10" idx="1"/>
+            <a:endCxn id="10" idx="0"/>
+          </p:cNvCxnSpPr>
+          <p:nvPr/>
+        </p:nvCxnSpPr>
+        <p:spPr>
+          <a:xfrm rot="5400000" flipH="1" flipV="1">
+            <a:off x="5486236" y="2655081"/>
+            <a:ext cx="157177" cy="534632"/>
+          </a:xfrm>
+          <a:prstGeom prst="curvedConnector3">
+            <a:avLst>
+              <a:gd name="adj1" fmla="val 245441"/>
+            </a:avLst>
+          </a:prstGeom>
+          <a:ln w="25400">
+            <a:tailEnd type="triangle" w="lg" len="med"/>
+          </a:ln>
+        </p:spPr>
+        <p:style>
+          <a:lnRef idx="1">
+            <a:schemeClr val="accent1"/>
+          </a:lnRef>
+          <a:fillRef idx="0">
+            <a:schemeClr val="accent1"/>
+          </a:fillRef>
+          <a:effectRef idx="0">
+            <a:schemeClr val="accent1"/>
+          </a:effectRef>
+          <a:fontRef idx="minor">
+            <a:schemeClr val="tx1"/>
+          </a:fontRef>
+        </p:style>
+      </p:cxnSp>
+    </p:spTree>
+    <p:extLst>
+      <p:ext uri="{BB962C8B-B14F-4D97-AF65-F5344CB8AC3E}">
+        <p14:creationId xmlns:p14="http://schemas.microsoft.com/office/powerpoint/2010/main" val="3194751196"/>
+      </p:ext>
+    </p:extLst>
+  </p:cSld>
+  <p:clrMapOvr>
+    <a:masterClrMapping/>
+  </p:clrMapOvr>
+</p:sld>
+</file>
+
 <file path=ppt/theme/theme1.xml><?xml version="1.0" encoding="utf-8"?>
 <a:theme xmlns:a="http://schemas.openxmlformats.org/drawingml/2006/main" name="Larissa">
   <a:themeElements>

</xml_diff>

<commit_message>
+ 2. Informationsbild gerastert
</commit_message>
<xml_diff>
--- a/Physikalismus.pptx
+++ b/Physikalismus.pptx
@@ -13,6 +13,7 @@
     <p:sldId id="261" r:id="rId7"/>
     <p:sldId id="262" r:id="rId8"/>
     <p:sldId id="263" r:id="rId9"/>
+    <p:sldId id="264" r:id="rId10"/>
   </p:sldIdLst>
   <p:sldSz cx="9144000" cy="6858000" type="screen4x3"/>
   <p:notesSz cx="6858000" cy="9144000"/>
@@ -295,7 +296,7 @@
           <a:p>
             <a:fld id="{8EAC6BE9-FF5B-4ADD-9934-8E43C44DF95B}" type="datetimeFigureOut">
               <a:rPr lang="de-DE" smtClean="0"/>
-              <a:t>26.09.2016</a:t>
+              <a:t>08.10.2016</a:t>
             </a:fld>
             <a:endParaRPr lang="de-DE"/>
           </a:p>
@@ -465,7 +466,7 @@
           <a:p>
             <a:fld id="{8EAC6BE9-FF5B-4ADD-9934-8E43C44DF95B}" type="datetimeFigureOut">
               <a:rPr lang="de-DE" smtClean="0"/>
-              <a:t>26.09.2016</a:t>
+              <a:t>08.10.2016</a:t>
             </a:fld>
             <a:endParaRPr lang="de-DE"/>
           </a:p>
@@ -645,7 +646,7 @@
           <a:p>
             <a:fld id="{8EAC6BE9-FF5B-4ADD-9934-8E43C44DF95B}" type="datetimeFigureOut">
               <a:rPr lang="de-DE" smtClean="0"/>
-              <a:t>26.09.2016</a:t>
+              <a:t>08.10.2016</a:t>
             </a:fld>
             <a:endParaRPr lang="de-DE"/>
           </a:p>
@@ -815,7 +816,7 @@
           <a:p>
             <a:fld id="{8EAC6BE9-FF5B-4ADD-9934-8E43C44DF95B}" type="datetimeFigureOut">
               <a:rPr lang="de-DE" smtClean="0"/>
-              <a:t>26.09.2016</a:t>
+              <a:t>08.10.2016</a:t>
             </a:fld>
             <a:endParaRPr lang="de-DE"/>
           </a:p>
@@ -1061,7 +1062,7 @@
           <a:p>
             <a:fld id="{8EAC6BE9-FF5B-4ADD-9934-8E43C44DF95B}" type="datetimeFigureOut">
               <a:rPr lang="de-DE" smtClean="0"/>
-              <a:t>26.09.2016</a:t>
+              <a:t>08.10.2016</a:t>
             </a:fld>
             <a:endParaRPr lang="de-DE"/>
           </a:p>
@@ -1349,7 +1350,7 @@
           <a:p>
             <a:fld id="{8EAC6BE9-FF5B-4ADD-9934-8E43C44DF95B}" type="datetimeFigureOut">
               <a:rPr lang="de-DE" smtClean="0"/>
-              <a:t>26.09.2016</a:t>
+              <a:t>08.10.2016</a:t>
             </a:fld>
             <a:endParaRPr lang="de-DE"/>
           </a:p>
@@ -1771,7 +1772,7 @@
           <a:p>
             <a:fld id="{8EAC6BE9-FF5B-4ADD-9934-8E43C44DF95B}" type="datetimeFigureOut">
               <a:rPr lang="de-DE" smtClean="0"/>
-              <a:t>26.09.2016</a:t>
+              <a:t>08.10.2016</a:t>
             </a:fld>
             <a:endParaRPr lang="de-DE"/>
           </a:p>
@@ -1889,7 +1890,7 @@
           <a:p>
             <a:fld id="{8EAC6BE9-FF5B-4ADD-9934-8E43C44DF95B}" type="datetimeFigureOut">
               <a:rPr lang="de-DE" smtClean="0"/>
-              <a:t>26.09.2016</a:t>
+              <a:t>08.10.2016</a:t>
             </a:fld>
             <a:endParaRPr lang="de-DE"/>
           </a:p>
@@ -1984,7 +1985,7 @@
           <a:p>
             <a:fld id="{8EAC6BE9-FF5B-4ADD-9934-8E43C44DF95B}" type="datetimeFigureOut">
               <a:rPr lang="de-DE" smtClean="0"/>
-              <a:t>26.09.2016</a:t>
+              <a:t>08.10.2016</a:t>
             </a:fld>
             <a:endParaRPr lang="de-DE"/>
           </a:p>
@@ -2261,7 +2262,7 @@
           <a:p>
             <a:fld id="{8EAC6BE9-FF5B-4ADD-9934-8E43C44DF95B}" type="datetimeFigureOut">
               <a:rPr lang="de-DE" smtClean="0"/>
-              <a:t>26.09.2016</a:t>
+              <a:t>08.10.2016</a:t>
             </a:fld>
             <a:endParaRPr lang="de-DE"/>
           </a:p>
@@ -2514,7 +2515,7 @@
           <a:p>
             <a:fld id="{8EAC6BE9-FF5B-4ADD-9934-8E43C44DF95B}" type="datetimeFigureOut">
               <a:rPr lang="de-DE" smtClean="0"/>
-              <a:t>26.09.2016</a:t>
+              <a:t>08.10.2016</a:t>
             </a:fld>
             <a:endParaRPr lang="de-DE"/>
           </a:p>
@@ -2727,7 +2728,7 @@
           <a:p>
             <a:fld id="{8EAC6BE9-FF5B-4ADD-9934-8E43C44DF95B}" type="datetimeFigureOut">
               <a:rPr lang="de-DE" smtClean="0"/>
-              <a:t>26.09.2016</a:t>
+              <a:t>08.10.2016</a:t>
             </a:fld>
             <a:endParaRPr lang="de-DE"/>
           </a:p>
@@ -7191,20 +7192,58 @@
           </a:p>
         </p:txBody>
       </p:sp>
-      <p:sp>
-        <p:nvSpPr>
-          <p:cNvPr id="10" name="Ellipse 9"/>
+    </p:spTree>
+    <p:extLst>
+      <p:ext uri="{BB962C8B-B14F-4D97-AF65-F5344CB8AC3E}">
+        <p14:creationId xmlns:p14="http://schemas.microsoft.com/office/powerpoint/2010/main" val="3194751196"/>
+      </p:ext>
+    </p:extLst>
+  </p:cSld>
+  <p:clrMapOvr>
+    <a:masterClrMapping/>
+  </p:clrMapOvr>
+</p:sld>
+</file>
+
+<file path=ppt/slides/slide9.xml><?xml version="1.0" encoding="utf-8"?>
+<p:sld xmlns:a="http://schemas.openxmlformats.org/drawingml/2006/main" xmlns:r="http://schemas.openxmlformats.org/officeDocument/2006/relationships" xmlns:p="http://schemas.openxmlformats.org/presentationml/2006/main">
+  <p:cSld>
+    <p:spTree>
+      <p:nvGrpSpPr>
+        <p:cNvPr id="1" name=""/>
+        <p:cNvGrpSpPr/>
+        <p:nvPr/>
+      </p:nvGrpSpPr>
+      <p:grpSpPr>
+        <a:xfrm>
+          <a:off x="0" y="0"/>
+          <a:ext cx="0" cy="0"/>
+          <a:chOff x="0" y="0"/>
+          <a:chExt cx="0" cy="0"/>
+        </a:xfrm>
+      </p:grpSpPr>
+      <p:sp>
+        <p:nvSpPr>
+          <p:cNvPr id="5" name="Flussdiagramm: Verbindungsstelle 4"/>
           <p:cNvSpPr/>
           <p:nvPr/>
         </p:nvSpPr>
         <p:spPr>
           <a:xfrm>
-            <a:off x="5076056" y="2843808"/>
-            <a:ext cx="1512168" cy="1073274"/>
-          </a:xfrm>
-          <a:prstGeom prst="ellipse">
-            <a:avLst/>
-          </a:prstGeom>
+            <a:off x="2483768" y="1340768"/>
+            <a:ext cx="4320000" cy="4320000"/>
+          </a:xfrm>
+          <a:prstGeom prst="flowChartConnector">
+            <a:avLst/>
+          </a:prstGeom>
+          <a:pattFill prst="lgGrid">
+            <a:fgClr>
+              <a:schemeClr val="accent1"/>
+            </a:fgClr>
+            <a:bgClr>
+              <a:schemeClr val="bg1"/>
+            </a:bgClr>
+          </a:pattFill>
         </p:spPr>
         <p:style>
           <a:lnRef idx="2">
@@ -7227,18 +7266,228 @@
           <a:lstStyle/>
           <a:p>
             <a:pPr algn="ctr"/>
-            <a:r>
-              <a:rPr lang="de-DE" smtClean="0"/>
-              <a:t>Bewusst-</a:t>
-            </a:r>
-          </a:p>
+            <a:endParaRPr lang="de-DE"/>
+          </a:p>
+        </p:txBody>
+      </p:sp>
+      <p:sp>
+        <p:nvSpPr>
+          <p:cNvPr id="6" name="Kreis 5"/>
+          <p:cNvSpPr/>
+          <p:nvPr/>
+        </p:nvSpPr>
+        <p:spPr>
+          <a:xfrm>
+            <a:off x="2483768" y="1340768"/>
+            <a:ext cx="4320000" cy="4320000"/>
+          </a:xfrm>
+          <a:prstGeom prst="pie">
+            <a:avLst>
+              <a:gd name="adj1" fmla="val 5388994"/>
+              <a:gd name="adj2" fmla="val 16200000"/>
+            </a:avLst>
+          </a:prstGeom>
+          <a:pattFill prst="lgGrid">
+            <a:fgClr>
+              <a:schemeClr val="bg1"/>
+            </a:fgClr>
+            <a:bgClr>
+              <a:schemeClr val="accent1"/>
+            </a:bgClr>
+          </a:pattFill>
+        </p:spPr>
+        <p:style>
+          <a:lnRef idx="2">
+            <a:schemeClr val="accent1">
+              <a:shade val="50000"/>
+            </a:schemeClr>
+          </a:lnRef>
+          <a:fillRef idx="1">
+            <a:schemeClr val="accent1"/>
+          </a:fillRef>
+          <a:effectRef idx="0">
+            <a:schemeClr val="accent1"/>
+          </a:effectRef>
+          <a:fontRef idx="minor">
+            <a:schemeClr val="lt1"/>
+          </a:fontRef>
+        </p:style>
+        <p:txBody>
+          <a:bodyPr rtlCol="0" anchor="ctr"/>
+          <a:lstStyle/>
           <a:p>
             <a:pPr algn="ctr"/>
-            <a:r>
-              <a:rPr lang="de-DE" smtClean="0"/>
-              <a:t>sein</a:t>
-            </a:r>
-            <a:endParaRPr lang="de-DE" dirty="0"/>
+            <a:endParaRPr lang="de-DE">
+              <a:solidFill>
+                <a:schemeClr val="tx1"/>
+              </a:solidFill>
+            </a:endParaRPr>
+          </a:p>
+        </p:txBody>
+      </p:sp>
+      <p:sp>
+        <p:nvSpPr>
+          <p:cNvPr id="8" name="Titel 1"/>
+          <p:cNvSpPr txBox="1">
+            <a:spLocks/>
+          </p:cNvSpPr>
+          <p:nvPr/>
+        </p:nvSpPr>
+        <p:spPr>
+          <a:xfrm>
+            <a:off x="3697560" y="1700808"/>
+            <a:ext cx="514400" cy="1143000"/>
+          </a:xfrm>
+          <a:prstGeom prst="rect">
+            <a:avLst/>
+          </a:prstGeom>
+        </p:spPr>
+        <p:txBody>
+          <a:bodyPr vert="horz" lIns="91440" tIns="45720" rIns="91440" bIns="45720" rtlCol="0" anchor="ctr">
+            <a:normAutofit/>
+          </a:bodyPr>
+          <a:lstStyle>
+            <a:lvl1pPr algn="ctr" defTabSz="914400" rtl="0" eaLnBrk="1" latinLnBrk="0" hangingPunct="1">
+              <a:spcBef>
+                <a:spcPct val="0"/>
+              </a:spcBef>
+              <a:buNone/>
+              <a:defRPr sz="4400" kern="1200">
+                <a:solidFill>
+                  <a:schemeClr val="tx1"/>
+                </a:solidFill>
+                <a:latin typeface="+mj-lt"/>
+                <a:ea typeface="+mj-ea"/>
+                <a:cs typeface="+mj-cs"/>
+              </a:defRPr>
+            </a:lvl1pPr>
+          </a:lstStyle>
+          <a:p>
+            <a:pPr algn="r"/>
+            <a:r>
+              <a:rPr lang="de-DE" smtClean="0">
+                <a:solidFill>
+                  <a:schemeClr val="bg1"/>
+                </a:solidFill>
+              </a:rPr>
+              <a:t>A</a:t>
+            </a:r>
+            <a:endParaRPr lang="de-DE" dirty="0">
+              <a:solidFill>
+                <a:schemeClr val="bg1"/>
+              </a:solidFill>
+            </a:endParaRPr>
+          </a:p>
+        </p:txBody>
+      </p:sp>
+      <p:sp>
+        <p:nvSpPr>
+          <p:cNvPr id="9" name="Titel 1"/>
+          <p:cNvSpPr txBox="1">
+            <a:spLocks/>
+          </p:cNvSpPr>
+          <p:nvPr/>
+        </p:nvSpPr>
+        <p:spPr>
+          <a:xfrm>
+            <a:off x="5065712" y="4230216"/>
+            <a:ext cx="514400" cy="1143000"/>
+          </a:xfrm>
+          <a:prstGeom prst="rect">
+            <a:avLst/>
+          </a:prstGeom>
+        </p:spPr>
+        <p:txBody>
+          <a:bodyPr vert="horz" lIns="91440" tIns="45720" rIns="91440" bIns="45720" rtlCol="0" anchor="ctr">
+            <a:normAutofit/>
+          </a:bodyPr>
+          <a:lstStyle>
+            <a:lvl1pPr algn="ctr" defTabSz="914400" rtl="0" eaLnBrk="1" latinLnBrk="0" hangingPunct="1">
+              <a:spcBef>
+                <a:spcPct val="0"/>
+              </a:spcBef>
+              <a:buNone/>
+              <a:defRPr sz="4400" kern="1200">
+                <a:solidFill>
+                  <a:schemeClr val="tx1"/>
+                </a:solidFill>
+                <a:latin typeface="+mj-lt"/>
+                <a:ea typeface="+mj-ea"/>
+                <a:cs typeface="+mj-cs"/>
+              </a:defRPr>
+            </a:lvl1pPr>
+          </a:lstStyle>
+          <a:p>
+            <a:pPr algn="r"/>
+            <a:r>
+              <a:rPr lang="de-DE">
+                <a:solidFill>
+                  <a:schemeClr val="accent5">
+                    <a:lumMod val="75000"/>
+                  </a:schemeClr>
+                </a:solidFill>
+              </a:rPr>
+              <a:t>B</a:t>
+            </a:r>
+            <a:endParaRPr lang="de-DE" dirty="0">
+              <a:solidFill>
+                <a:schemeClr val="accent5">
+                  <a:lumMod val="75000"/>
+                </a:schemeClr>
+              </a:solidFill>
+            </a:endParaRPr>
+          </a:p>
+        </p:txBody>
+      </p:sp>
+      <p:sp>
+        <p:nvSpPr>
+          <p:cNvPr id="10" name="Ellipse 9"/>
+          <p:cNvSpPr/>
+          <p:nvPr/>
+        </p:nvSpPr>
+        <p:spPr>
+          <a:xfrm>
+            <a:off x="4860032" y="2843808"/>
+            <a:ext cx="1872208" cy="1161256"/>
+          </a:xfrm>
+          <a:prstGeom prst="ellipse">
+            <a:avLst/>
+          </a:prstGeom>
+          <a:pattFill prst="openDmnd">
+            <a:fgClr>
+              <a:schemeClr val="bg1"/>
+            </a:fgClr>
+            <a:bgClr>
+              <a:schemeClr val="accent1"/>
+            </a:bgClr>
+          </a:pattFill>
+        </p:spPr>
+        <p:style>
+          <a:lnRef idx="2">
+            <a:schemeClr val="accent1">
+              <a:shade val="50000"/>
+            </a:schemeClr>
+          </a:lnRef>
+          <a:fillRef idx="1">
+            <a:schemeClr val="accent1"/>
+          </a:fillRef>
+          <a:effectRef idx="0">
+            <a:schemeClr val="accent1"/>
+          </a:effectRef>
+          <a:fontRef idx="minor">
+            <a:schemeClr val="lt1"/>
+          </a:fontRef>
+        </p:style>
+        <p:txBody>
+          <a:bodyPr rtlCol="0" anchor="ctr"/>
+          <a:lstStyle/>
+          <a:p>
+            <a:pPr algn="ctr"/>
+            <a:r>
+              <a:rPr lang="de-DE" sz="2800" smtClean="0"/>
+              <a:t>Denken</a:t>
+            </a:r>
+            <a:endParaRPr lang="de-DE" sz="2800" dirty="0"/>
           </a:p>
         </p:txBody>
       </p:sp>
@@ -7253,12 +7502,12 @@
         </p:nvCxnSpPr>
         <p:spPr>
           <a:xfrm rot="5400000" flipH="1" flipV="1">
-            <a:off x="5486236" y="2655081"/>
-            <a:ext cx="157177" cy="534632"/>
+            <a:off x="5380142" y="2597877"/>
+            <a:ext cx="170062" cy="661925"/>
           </a:xfrm>
           <a:prstGeom prst="curvedConnector3">
             <a:avLst>
-              <a:gd name="adj1" fmla="val 245441"/>
+              <a:gd name="adj1" fmla="val 234422"/>
             </a:avLst>
           </a:prstGeom>
           <a:ln w="25400">
@@ -7283,7 +7532,7 @@
     </p:spTree>
     <p:extLst>
       <p:ext uri="{BB962C8B-B14F-4D97-AF65-F5344CB8AC3E}">
-        <p14:creationId xmlns:p14="http://schemas.microsoft.com/office/powerpoint/2010/main" val="3194751196"/>
+        <p14:creationId xmlns:p14="http://schemas.microsoft.com/office/powerpoint/2010/main" val="3998683137"/>
       </p:ext>
     </p:extLst>
   </p:cSld>

</xml_diff>

<commit_message>
Unitärer Raum abgeschlossen. Uff!
</commit_message>
<xml_diff>
--- a/Physikalismus.pptx
+++ b/Physikalismus.pptx
@@ -14,6 +14,7 @@
     <p:sldId id="262" r:id="rId8"/>
     <p:sldId id="263" r:id="rId9"/>
     <p:sldId id="264" r:id="rId10"/>
+    <p:sldId id="265" r:id="rId11"/>
   </p:sldIdLst>
   <p:sldSz cx="9144000" cy="6858000" type="screen4x3"/>
   <p:notesSz cx="6858000" cy="9144000"/>
@@ -296,7 +297,7 @@
           <a:p>
             <a:fld id="{8EAC6BE9-FF5B-4ADD-9934-8E43C44DF95B}" type="datetimeFigureOut">
               <a:rPr lang="de-DE" smtClean="0"/>
-              <a:t>08.10.2016</a:t>
+              <a:t>18.03.2017</a:t>
             </a:fld>
             <a:endParaRPr lang="de-DE"/>
           </a:p>
@@ -466,7 +467,7 @@
           <a:p>
             <a:fld id="{8EAC6BE9-FF5B-4ADD-9934-8E43C44DF95B}" type="datetimeFigureOut">
               <a:rPr lang="de-DE" smtClean="0"/>
-              <a:t>08.10.2016</a:t>
+              <a:t>18.03.2017</a:t>
             </a:fld>
             <a:endParaRPr lang="de-DE"/>
           </a:p>
@@ -646,7 +647,7 @@
           <a:p>
             <a:fld id="{8EAC6BE9-FF5B-4ADD-9934-8E43C44DF95B}" type="datetimeFigureOut">
               <a:rPr lang="de-DE" smtClean="0"/>
-              <a:t>08.10.2016</a:t>
+              <a:t>18.03.2017</a:t>
             </a:fld>
             <a:endParaRPr lang="de-DE"/>
           </a:p>
@@ -816,7 +817,7 @@
           <a:p>
             <a:fld id="{8EAC6BE9-FF5B-4ADD-9934-8E43C44DF95B}" type="datetimeFigureOut">
               <a:rPr lang="de-DE" smtClean="0"/>
-              <a:t>08.10.2016</a:t>
+              <a:t>18.03.2017</a:t>
             </a:fld>
             <a:endParaRPr lang="de-DE"/>
           </a:p>
@@ -1062,7 +1063,7 @@
           <a:p>
             <a:fld id="{8EAC6BE9-FF5B-4ADD-9934-8E43C44DF95B}" type="datetimeFigureOut">
               <a:rPr lang="de-DE" smtClean="0"/>
-              <a:t>08.10.2016</a:t>
+              <a:t>18.03.2017</a:t>
             </a:fld>
             <a:endParaRPr lang="de-DE"/>
           </a:p>
@@ -1350,7 +1351,7 @@
           <a:p>
             <a:fld id="{8EAC6BE9-FF5B-4ADD-9934-8E43C44DF95B}" type="datetimeFigureOut">
               <a:rPr lang="de-DE" smtClean="0"/>
-              <a:t>08.10.2016</a:t>
+              <a:t>18.03.2017</a:t>
             </a:fld>
             <a:endParaRPr lang="de-DE"/>
           </a:p>
@@ -1772,7 +1773,7 @@
           <a:p>
             <a:fld id="{8EAC6BE9-FF5B-4ADD-9934-8E43C44DF95B}" type="datetimeFigureOut">
               <a:rPr lang="de-DE" smtClean="0"/>
-              <a:t>08.10.2016</a:t>
+              <a:t>18.03.2017</a:t>
             </a:fld>
             <a:endParaRPr lang="de-DE"/>
           </a:p>
@@ -1890,7 +1891,7 @@
           <a:p>
             <a:fld id="{8EAC6BE9-FF5B-4ADD-9934-8E43C44DF95B}" type="datetimeFigureOut">
               <a:rPr lang="de-DE" smtClean="0"/>
-              <a:t>08.10.2016</a:t>
+              <a:t>18.03.2017</a:t>
             </a:fld>
             <a:endParaRPr lang="de-DE"/>
           </a:p>
@@ -1985,7 +1986,7 @@
           <a:p>
             <a:fld id="{8EAC6BE9-FF5B-4ADD-9934-8E43C44DF95B}" type="datetimeFigureOut">
               <a:rPr lang="de-DE" smtClean="0"/>
-              <a:t>08.10.2016</a:t>
+              <a:t>18.03.2017</a:t>
             </a:fld>
             <a:endParaRPr lang="de-DE"/>
           </a:p>
@@ -2262,7 +2263,7 @@
           <a:p>
             <a:fld id="{8EAC6BE9-FF5B-4ADD-9934-8E43C44DF95B}" type="datetimeFigureOut">
               <a:rPr lang="de-DE" smtClean="0"/>
-              <a:t>08.10.2016</a:t>
+              <a:t>18.03.2017</a:t>
             </a:fld>
             <a:endParaRPr lang="de-DE"/>
           </a:p>
@@ -2515,7 +2516,7 @@
           <a:p>
             <a:fld id="{8EAC6BE9-FF5B-4ADD-9934-8E43C44DF95B}" type="datetimeFigureOut">
               <a:rPr lang="de-DE" smtClean="0"/>
-              <a:t>08.10.2016</a:t>
+              <a:t>18.03.2017</a:t>
             </a:fld>
             <a:endParaRPr lang="de-DE"/>
           </a:p>
@@ -2728,7 +2729,7 @@
           <a:p>
             <a:fld id="{8EAC6BE9-FF5B-4ADD-9934-8E43C44DF95B}" type="datetimeFigureOut">
               <a:rPr lang="de-DE" smtClean="0"/>
-              <a:t>08.10.2016</a:t>
+              <a:t>18.03.2017</a:t>
             </a:fld>
             <a:endParaRPr lang="de-DE"/>
           </a:p>
@@ -3830,6 +3831,590 @@
     <p:extLst>
       <p:ext uri="{BB962C8B-B14F-4D97-AF65-F5344CB8AC3E}">
         <p14:creationId xmlns:p14="http://schemas.microsoft.com/office/powerpoint/2010/main" val="2506533234"/>
+      </p:ext>
+    </p:extLst>
+  </p:cSld>
+  <p:clrMapOvr>
+    <a:masterClrMapping/>
+  </p:clrMapOvr>
+</p:sld>
+</file>
+
+<file path=ppt/slides/slide10.xml><?xml version="1.0" encoding="utf-8"?>
+<p:sld xmlns:a="http://schemas.openxmlformats.org/drawingml/2006/main" xmlns:r="http://schemas.openxmlformats.org/officeDocument/2006/relationships" xmlns:p="http://schemas.openxmlformats.org/presentationml/2006/main">
+  <p:cSld>
+    <p:spTree>
+      <p:nvGrpSpPr>
+        <p:cNvPr id="1" name=""/>
+        <p:cNvGrpSpPr/>
+        <p:nvPr/>
+      </p:nvGrpSpPr>
+      <p:grpSpPr>
+        <a:xfrm>
+          <a:off x="0" y="0"/>
+          <a:ext cx="0" cy="0"/>
+          <a:chOff x="0" y="0"/>
+          <a:chExt cx="0" cy="0"/>
+        </a:xfrm>
+      </p:grpSpPr>
+      <p:sp>
+        <p:nvSpPr>
+          <p:cNvPr id="5" name="Flussdiagramm: Prozess 4"/>
+          <p:cNvSpPr/>
+          <p:nvPr/>
+        </p:nvSpPr>
+        <p:spPr>
+          <a:xfrm>
+            <a:off x="1115616" y="1772816"/>
+            <a:ext cx="2304256" cy="3096344"/>
+          </a:xfrm>
+          <a:prstGeom prst="flowChartProcess">
+            <a:avLst/>
+          </a:prstGeom>
+          <a:solidFill>
+            <a:schemeClr val="bg1">
+              <a:lumMod val="75000"/>
+            </a:schemeClr>
+          </a:solidFill>
+          <a:ln cmpd="sng">
+            <a:solidFill>
+              <a:schemeClr val="tx1"/>
+            </a:solidFill>
+          </a:ln>
+        </p:spPr>
+        <p:style>
+          <a:lnRef idx="2">
+            <a:schemeClr val="accent1">
+              <a:shade val="50000"/>
+            </a:schemeClr>
+          </a:lnRef>
+          <a:fillRef idx="1">
+            <a:schemeClr val="accent1"/>
+          </a:fillRef>
+          <a:effectRef idx="0">
+            <a:schemeClr val="accent1"/>
+          </a:effectRef>
+          <a:fontRef idx="minor">
+            <a:schemeClr val="lt1"/>
+          </a:fontRef>
+        </p:style>
+        <p:txBody>
+          <a:bodyPr rtlCol="0" anchor="ctr"/>
+          <a:lstStyle/>
+          <a:p>
+            <a:pPr algn="ctr"/>
+            <a:r>
+              <a:rPr lang="de-DE" smtClean="0"/>
+              <a:t>Graubereich</a:t>
+            </a:r>
+            <a:endParaRPr lang="de-DE"/>
+          </a:p>
+        </p:txBody>
+      </p:sp>
+      <p:sp>
+        <p:nvSpPr>
+          <p:cNvPr id="6" name="Flussdiagramm: Prozess 5"/>
+          <p:cNvSpPr/>
+          <p:nvPr/>
+        </p:nvSpPr>
+        <p:spPr>
+          <a:xfrm>
+            <a:off x="1115616" y="1772816"/>
+            <a:ext cx="2304256" cy="648072"/>
+          </a:xfrm>
+          <a:prstGeom prst="flowChartProcess">
+            <a:avLst/>
+          </a:prstGeom>
+          <a:solidFill>
+            <a:srgbClr val="92D050"/>
+          </a:solidFill>
+          <a:ln cmpd="sng">
+            <a:solidFill>
+              <a:schemeClr val="tx1"/>
+            </a:solidFill>
+          </a:ln>
+        </p:spPr>
+        <p:style>
+          <a:lnRef idx="2">
+            <a:schemeClr val="accent1">
+              <a:shade val="50000"/>
+            </a:schemeClr>
+          </a:lnRef>
+          <a:fillRef idx="1">
+            <a:schemeClr val="accent1"/>
+          </a:fillRef>
+          <a:effectRef idx="0">
+            <a:schemeClr val="accent1"/>
+          </a:effectRef>
+          <a:fontRef idx="minor">
+            <a:schemeClr val="lt1"/>
+          </a:fontRef>
+        </p:style>
+        <p:txBody>
+          <a:bodyPr rtlCol="0" anchor="ctr"/>
+          <a:lstStyle/>
+          <a:p>
+            <a:pPr algn="ctr"/>
+            <a:r>
+              <a:rPr lang="de-DE"/>
+              <a:t>1</a:t>
+            </a:r>
+          </a:p>
+        </p:txBody>
+      </p:sp>
+      <p:sp>
+        <p:nvSpPr>
+          <p:cNvPr id="7" name="Flussdiagramm: Prozess 6"/>
+          <p:cNvSpPr/>
+          <p:nvPr/>
+        </p:nvSpPr>
+        <p:spPr>
+          <a:xfrm>
+            <a:off x="1115616" y="4218590"/>
+            <a:ext cx="2304256" cy="648072"/>
+          </a:xfrm>
+          <a:prstGeom prst="flowChartProcess">
+            <a:avLst/>
+          </a:prstGeom>
+          <a:solidFill>
+            <a:srgbClr val="FF0000"/>
+          </a:solidFill>
+          <a:ln cmpd="sng">
+            <a:solidFill>
+              <a:schemeClr val="tx1"/>
+            </a:solidFill>
+          </a:ln>
+        </p:spPr>
+        <p:style>
+          <a:lnRef idx="2">
+            <a:schemeClr val="accent1">
+              <a:shade val="50000"/>
+            </a:schemeClr>
+          </a:lnRef>
+          <a:fillRef idx="1">
+            <a:schemeClr val="accent1"/>
+          </a:fillRef>
+          <a:effectRef idx="0">
+            <a:schemeClr val="accent1"/>
+          </a:effectRef>
+          <a:fontRef idx="minor">
+            <a:schemeClr val="lt1"/>
+          </a:fontRef>
+        </p:style>
+        <p:txBody>
+          <a:bodyPr rtlCol="0" anchor="ctr"/>
+          <a:lstStyle/>
+          <a:p>
+            <a:pPr algn="ctr"/>
+            <a:r>
+              <a:rPr lang="de-DE" smtClean="0"/>
+              <a:t>0</a:t>
+            </a:r>
+            <a:endParaRPr lang="de-DE"/>
+          </a:p>
+        </p:txBody>
+      </p:sp>
+      <p:sp>
+        <p:nvSpPr>
+          <p:cNvPr id="8" name="Flussdiagramm: Prozess 7"/>
+          <p:cNvSpPr/>
+          <p:nvPr/>
+        </p:nvSpPr>
+        <p:spPr>
+          <a:xfrm>
+            <a:off x="5580112" y="1772816"/>
+            <a:ext cx="2304256" cy="3096344"/>
+          </a:xfrm>
+          <a:prstGeom prst="flowChartProcess">
+            <a:avLst/>
+          </a:prstGeom>
+          <a:solidFill>
+            <a:schemeClr val="bg1">
+              <a:lumMod val="75000"/>
+            </a:schemeClr>
+          </a:solidFill>
+          <a:ln cmpd="sng">
+            <a:solidFill>
+              <a:schemeClr val="tx1"/>
+            </a:solidFill>
+          </a:ln>
+        </p:spPr>
+        <p:style>
+          <a:lnRef idx="2">
+            <a:schemeClr val="accent1">
+              <a:shade val="50000"/>
+            </a:schemeClr>
+          </a:lnRef>
+          <a:fillRef idx="1">
+            <a:schemeClr val="accent1"/>
+          </a:fillRef>
+          <a:effectRef idx="0">
+            <a:schemeClr val="accent1"/>
+          </a:effectRef>
+          <a:fontRef idx="minor">
+            <a:schemeClr val="lt1"/>
+          </a:fontRef>
+        </p:style>
+        <p:txBody>
+          <a:bodyPr rtlCol="0" anchor="ctr"/>
+          <a:lstStyle/>
+          <a:p>
+            <a:pPr algn="ctr"/>
+            <a:r>
+              <a:rPr lang="de-DE" smtClean="0"/>
+              <a:t>Graubereich</a:t>
+            </a:r>
+            <a:endParaRPr lang="de-DE"/>
+          </a:p>
+        </p:txBody>
+      </p:sp>
+      <p:sp>
+        <p:nvSpPr>
+          <p:cNvPr id="9" name="Flussdiagramm: Prozess 8"/>
+          <p:cNvSpPr/>
+          <p:nvPr/>
+        </p:nvSpPr>
+        <p:spPr>
+          <a:xfrm>
+            <a:off x="5580112" y="1772816"/>
+            <a:ext cx="2304256" cy="936104"/>
+          </a:xfrm>
+          <a:prstGeom prst="flowChartProcess">
+            <a:avLst/>
+          </a:prstGeom>
+          <a:solidFill>
+            <a:srgbClr val="92D050"/>
+          </a:solidFill>
+          <a:ln cmpd="sng">
+            <a:solidFill>
+              <a:schemeClr val="tx1"/>
+            </a:solidFill>
+          </a:ln>
+        </p:spPr>
+        <p:style>
+          <a:lnRef idx="2">
+            <a:schemeClr val="accent1">
+              <a:shade val="50000"/>
+            </a:schemeClr>
+          </a:lnRef>
+          <a:fillRef idx="1">
+            <a:schemeClr val="accent1"/>
+          </a:fillRef>
+          <a:effectRef idx="0">
+            <a:schemeClr val="accent1"/>
+          </a:effectRef>
+          <a:fontRef idx="minor">
+            <a:schemeClr val="lt1"/>
+          </a:fontRef>
+        </p:style>
+        <p:txBody>
+          <a:bodyPr rtlCol="0" anchor="ctr"/>
+          <a:lstStyle/>
+          <a:p>
+            <a:pPr algn="ctr"/>
+            <a:r>
+              <a:rPr lang="de-DE"/>
+              <a:t>1</a:t>
+            </a:r>
+          </a:p>
+        </p:txBody>
+      </p:sp>
+      <p:sp>
+        <p:nvSpPr>
+          <p:cNvPr id="10" name="Flussdiagramm: Prozess 9"/>
+          <p:cNvSpPr/>
+          <p:nvPr/>
+        </p:nvSpPr>
+        <p:spPr>
+          <a:xfrm>
+            <a:off x="5580112" y="3933056"/>
+            <a:ext cx="2304256" cy="933606"/>
+          </a:xfrm>
+          <a:prstGeom prst="flowChartProcess">
+            <a:avLst/>
+          </a:prstGeom>
+          <a:solidFill>
+            <a:srgbClr val="FF0000"/>
+          </a:solidFill>
+          <a:ln cmpd="sng">
+            <a:solidFill>
+              <a:schemeClr val="tx1"/>
+            </a:solidFill>
+          </a:ln>
+        </p:spPr>
+        <p:style>
+          <a:lnRef idx="2">
+            <a:schemeClr val="accent1">
+              <a:shade val="50000"/>
+            </a:schemeClr>
+          </a:lnRef>
+          <a:fillRef idx="1">
+            <a:schemeClr val="accent1"/>
+          </a:fillRef>
+          <a:effectRef idx="0">
+            <a:schemeClr val="accent1"/>
+          </a:effectRef>
+          <a:fontRef idx="minor">
+            <a:schemeClr val="lt1"/>
+          </a:fontRef>
+        </p:style>
+        <p:txBody>
+          <a:bodyPr rtlCol="0" anchor="ctr"/>
+          <a:lstStyle/>
+          <a:p>
+            <a:pPr algn="ctr"/>
+            <a:r>
+              <a:rPr lang="de-DE" smtClean="0"/>
+              <a:t>0</a:t>
+            </a:r>
+            <a:endParaRPr lang="de-DE"/>
+          </a:p>
+        </p:txBody>
+      </p:sp>
+      <p:sp>
+        <p:nvSpPr>
+          <p:cNvPr id="11" name="Textfeld 10"/>
+          <p:cNvSpPr txBox="1"/>
+          <p:nvPr/>
+        </p:nvSpPr>
+        <p:spPr>
+          <a:xfrm>
+            <a:off x="1835696" y="1259468"/>
+            <a:ext cx="845103" cy="369332"/>
+          </a:xfrm>
+          <a:prstGeom prst="rect">
+            <a:avLst/>
+          </a:prstGeom>
+          <a:noFill/>
+        </p:spPr>
+        <p:txBody>
+          <a:bodyPr wrap="none" rtlCol="0">
+            <a:spAutoFit/>
+          </a:bodyPr>
+          <a:lstStyle/>
+          <a:p>
+            <a:r>
+              <a:rPr lang="de-DE" smtClean="0"/>
+              <a:t>Sender</a:t>
+            </a:r>
+            <a:endParaRPr lang="de-DE"/>
+          </a:p>
+        </p:txBody>
+      </p:sp>
+      <p:sp>
+        <p:nvSpPr>
+          <p:cNvPr id="12" name="Textfeld 11"/>
+          <p:cNvSpPr txBox="1"/>
+          <p:nvPr/>
+        </p:nvSpPr>
+        <p:spPr>
+          <a:xfrm>
+            <a:off x="6156176" y="1268760"/>
+            <a:ext cx="1202252" cy="369332"/>
+          </a:xfrm>
+          <a:prstGeom prst="rect">
+            <a:avLst/>
+          </a:prstGeom>
+          <a:noFill/>
+        </p:spPr>
+        <p:txBody>
+          <a:bodyPr wrap="none" rtlCol="0">
+            <a:spAutoFit/>
+          </a:bodyPr>
+          <a:lstStyle/>
+          <a:p>
+            <a:r>
+              <a:rPr lang="de-DE" smtClean="0"/>
+              <a:t>Empfänger</a:t>
+            </a:r>
+            <a:endParaRPr lang="de-DE"/>
+          </a:p>
+        </p:txBody>
+      </p:sp>
+      <p:cxnSp>
+        <p:nvCxnSpPr>
+          <p:cNvPr id="14" name="Gerade Verbindung 13"/>
+          <p:cNvCxnSpPr/>
+          <p:nvPr/>
+        </p:nvCxnSpPr>
+        <p:spPr>
+          <a:xfrm>
+            <a:off x="3491880" y="2420888"/>
+            <a:ext cx="2016224" cy="0"/>
+          </a:xfrm>
+          <a:prstGeom prst="line">
+            <a:avLst/>
+          </a:prstGeom>
+        </p:spPr>
+        <p:style>
+          <a:lnRef idx="1">
+            <a:schemeClr val="accent1"/>
+          </a:lnRef>
+          <a:fillRef idx="0">
+            <a:schemeClr val="accent1"/>
+          </a:fillRef>
+          <a:effectRef idx="0">
+            <a:schemeClr val="accent1"/>
+          </a:effectRef>
+          <a:fontRef idx="minor">
+            <a:schemeClr val="tx1"/>
+          </a:fontRef>
+        </p:style>
+      </p:cxnSp>
+      <p:cxnSp>
+        <p:nvCxnSpPr>
+          <p:cNvPr id="15" name="Gerade Verbindung 14"/>
+          <p:cNvCxnSpPr/>
+          <p:nvPr/>
+        </p:nvCxnSpPr>
+        <p:spPr>
+          <a:xfrm>
+            <a:off x="3491880" y="2708920"/>
+            <a:ext cx="2016224" cy="0"/>
+          </a:xfrm>
+          <a:prstGeom prst="line">
+            <a:avLst/>
+          </a:prstGeom>
+        </p:spPr>
+        <p:style>
+          <a:lnRef idx="1">
+            <a:schemeClr val="accent1"/>
+          </a:lnRef>
+          <a:fillRef idx="0">
+            <a:schemeClr val="accent1"/>
+          </a:fillRef>
+          <a:effectRef idx="0">
+            <a:schemeClr val="accent1"/>
+          </a:effectRef>
+          <a:fontRef idx="minor">
+            <a:schemeClr val="tx1"/>
+          </a:fontRef>
+        </p:style>
+      </p:cxnSp>
+      <p:cxnSp>
+        <p:nvCxnSpPr>
+          <p:cNvPr id="16" name="Gerade Verbindung 15"/>
+          <p:cNvCxnSpPr/>
+          <p:nvPr/>
+        </p:nvCxnSpPr>
+        <p:spPr>
+          <a:xfrm>
+            <a:off x="3491880" y="3933056"/>
+            <a:ext cx="2016224" cy="0"/>
+          </a:xfrm>
+          <a:prstGeom prst="line">
+            <a:avLst/>
+          </a:prstGeom>
+        </p:spPr>
+        <p:style>
+          <a:lnRef idx="1">
+            <a:schemeClr val="accent1"/>
+          </a:lnRef>
+          <a:fillRef idx="0">
+            <a:schemeClr val="accent1"/>
+          </a:fillRef>
+          <a:effectRef idx="0">
+            <a:schemeClr val="accent1"/>
+          </a:effectRef>
+          <a:fontRef idx="minor">
+            <a:schemeClr val="tx1"/>
+          </a:fontRef>
+        </p:style>
+      </p:cxnSp>
+      <p:cxnSp>
+        <p:nvCxnSpPr>
+          <p:cNvPr id="17" name="Gerade Verbindung 16"/>
+          <p:cNvCxnSpPr/>
+          <p:nvPr/>
+        </p:nvCxnSpPr>
+        <p:spPr>
+          <a:xfrm>
+            <a:off x="3491880" y="4221088"/>
+            <a:ext cx="2016224" cy="0"/>
+          </a:xfrm>
+          <a:prstGeom prst="line">
+            <a:avLst/>
+          </a:prstGeom>
+        </p:spPr>
+        <p:style>
+          <a:lnRef idx="1">
+            <a:schemeClr val="accent1"/>
+          </a:lnRef>
+          <a:fillRef idx="0">
+            <a:schemeClr val="accent1"/>
+          </a:fillRef>
+          <a:effectRef idx="0">
+            <a:schemeClr val="accent1"/>
+          </a:effectRef>
+          <a:fontRef idx="minor">
+            <a:schemeClr val="tx1"/>
+          </a:fontRef>
+        </p:style>
+      </p:cxnSp>
+      <p:sp>
+        <p:nvSpPr>
+          <p:cNvPr id="18" name="Textfeld 17"/>
+          <p:cNvSpPr txBox="1"/>
+          <p:nvPr/>
+        </p:nvSpPr>
+        <p:spPr>
+          <a:xfrm>
+            <a:off x="3516594" y="2386882"/>
+            <a:ext cx="1962268" cy="369332"/>
+          </a:xfrm>
+          <a:prstGeom prst="rect">
+            <a:avLst/>
+          </a:prstGeom>
+          <a:noFill/>
+        </p:spPr>
+        <p:txBody>
+          <a:bodyPr wrap="none" rtlCol="0">
+            <a:spAutoFit/>
+          </a:bodyPr>
+          <a:lstStyle/>
+          <a:p>
+            <a:r>
+              <a:rPr lang="de-DE" smtClean="0"/>
+              <a:t>Sicherheitsabstand</a:t>
+            </a:r>
+            <a:endParaRPr lang="de-DE"/>
+          </a:p>
+        </p:txBody>
+      </p:sp>
+      <p:sp>
+        <p:nvSpPr>
+          <p:cNvPr id="19" name="Textfeld 18"/>
+          <p:cNvSpPr txBox="1"/>
+          <p:nvPr/>
+        </p:nvSpPr>
+        <p:spPr>
+          <a:xfrm>
+            <a:off x="3516594" y="3890812"/>
+            <a:ext cx="1962268" cy="369332"/>
+          </a:xfrm>
+          <a:prstGeom prst="rect">
+            <a:avLst/>
+          </a:prstGeom>
+          <a:noFill/>
+        </p:spPr>
+        <p:txBody>
+          <a:bodyPr wrap="none" rtlCol="0">
+            <a:spAutoFit/>
+          </a:bodyPr>
+          <a:lstStyle/>
+          <a:p>
+            <a:r>
+              <a:rPr lang="de-DE" smtClean="0"/>
+              <a:t>Sicherheitsabstand</a:t>
+            </a:r>
+            <a:endParaRPr lang="de-DE"/>
+          </a:p>
+        </p:txBody>
+      </p:sp>
+    </p:spTree>
+    <p:extLst>
+      <p:ext uri="{BB962C8B-B14F-4D97-AF65-F5344CB8AC3E}">
+        <p14:creationId xmlns:p14="http://schemas.microsoft.com/office/powerpoint/2010/main" val="1300753874"/>
       </p:ext>
     </p:extLst>
   </p:cSld>

</xml_diff>

<commit_message>
delta S > 0 ?
</commit_message>
<xml_diff>
--- a/Physikalismus.pptx
+++ b/Physikalismus.pptx
@@ -16,6 +16,7 @@
     <p:sldId id="264" r:id="rId10"/>
     <p:sldId id="265" r:id="rId11"/>
     <p:sldId id="266" r:id="rId12"/>
+    <p:sldId id="267" r:id="rId13"/>
   </p:sldIdLst>
   <p:sldSz cx="9144000" cy="6858000" type="screen4x3"/>
   <p:notesSz cx="6858000" cy="9144000"/>
@@ -298,7 +299,7 @@
           <a:p>
             <a:fld id="{8EAC6BE9-FF5B-4ADD-9934-8E43C44DF95B}" type="datetimeFigureOut">
               <a:rPr lang="de-DE" smtClean="0"/>
-              <a:t>01.10.2017</a:t>
+              <a:t>10.10.2017</a:t>
             </a:fld>
             <a:endParaRPr lang="de-DE"/>
           </a:p>
@@ -468,7 +469,7 @@
           <a:p>
             <a:fld id="{8EAC6BE9-FF5B-4ADD-9934-8E43C44DF95B}" type="datetimeFigureOut">
               <a:rPr lang="de-DE" smtClean="0"/>
-              <a:t>01.10.2017</a:t>
+              <a:t>10.10.2017</a:t>
             </a:fld>
             <a:endParaRPr lang="de-DE"/>
           </a:p>
@@ -648,7 +649,7 @@
           <a:p>
             <a:fld id="{8EAC6BE9-FF5B-4ADD-9934-8E43C44DF95B}" type="datetimeFigureOut">
               <a:rPr lang="de-DE" smtClean="0"/>
-              <a:t>01.10.2017</a:t>
+              <a:t>10.10.2017</a:t>
             </a:fld>
             <a:endParaRPr lang="de-DE"/>
           </a:p>
@@ -818,7 +819,7 @@
           <a:p>
             <a:fld id="{8EAC6BE9-FF5B-4ADD-9934-8E43C44DF95B}" type="datetimeFigureOut">
               <a:rPr lang="de-DE" smtClean="0"/>
-              <a:t>01.10.2017</a:t>
+              <a:t>10.10.2017</a:t>
             </a:fld>
             <a:endParaRPr lang="de-DE"/>
           </a:p>
@@ -1064,7 +1065,7 @@
           <a:p>
             <a:fld id="{8EAC6BE9-FF5B-4ADD-9934-8E43C44DF95B}" type="datetimeFigureOut">
               <a:rPr lang="de-DE" smtClean="0"/>
-              <a:t>01.10.2017</a:t>
+              <a:t>10.10.2017</a:t>
             </a:fld>
             <a:endParaRPr lang="de-DE"/>
           </a:p>
@@ -1352,7 +1353,7 @@
           <a:p>
             <a:fld id="{8EAC6BE9-FF5B-4ADD-9934-8E43C44DF95B}" type="datetimeFigureOut">
               <a:rPr lang="de-DE" smtClean="0"/>
-              <a:t>01.10.2017</a:t>
+              <a:t>10.10.2017</a:t>
             </a:fld>
             <a:endParaRPr lang="de-DE"/>
           </a:p>
@@ -1774,7 +1775,7 @@
           <a:p>
             <a:fld id="{8EAC6BE9-FF5B-4ADD-9934-8E43C44DF95B}" type="datetimeFigureOut">
               <a:rPr lang="de-DE" smtClean="0"/>
-              <a:t>01.10.2017</a:t>
+              <a:t>10.10.2017</a:t>
             </a:fld>
             <a:endParaRPr lang="de-DE"/>
           </a:p>
@@ -1892,7 +1893,7 @@
           <a:p>
             <a:fld id="{8EAC6BE9-FF5B-4ADD-9934-8E43C44DF95B}" type="datetimeFigureOut">
               <a:rPr lang="de-DE" smtClean="0"/>
-              <a:t>01.10.2017</a:t>
+              <a:t>10.10.2017</a:t>
             </a:fld>
             <a:endParaRPr lang="de-DE"/>
           </a:p>
@@ -1987,7 +1988,7 @@
           <a:p>
             <a:fld id="{8EAC6BE9-FF5B-4ADD-9934-8E43C44DF95B}" type="datetimeFigureOut">
               <a:rPr lang="de-DE" smtClean="0"/>
-              <a:t>01.10.2017</a:t>
+              <a:t>10.10.2017</a:t>
             </a:fld>
             <a:endParaRPr lang="de-DE"/>
           </a:p>
@@ -2264,7 +2265,7 @@
           <a:p>
             <a:fld id="{8EAC6BE9-FF5B-4ADD-9934-8E43C44DF95B}" type="datetimeFigureOut">
               <a:rPr lang="de-DE" smtClean="0"/>
-              <a:t>01.10.2017</a:t>
+              <a:t>10.10.2017</a:t>
             </a:fld>
             <a:endParaRPr lang="de-DE"/>
           </a:p>
@@ -2517,7 +2518,7 @@
           <a:p>
             <a:fld id="{8EAC6BE9-FF5B-4ADD-9934-8E43C44DF95B}" type="datetimeFigureOut">
               <a:rPr lang="de-DE" smtClean="0"/>
-              <a:t>01.10.2017</a:t>
+              <a:t>10.10.2017</a:t>
             </a:fld>
             <a:endParaRPr lang="de-DE"/>
           </a:p>
@@ -2730,7 +2731,7 @@
           <a:p>
             <a:fld id="{8EAC6BE9-FF5B-4ADD-9934-8E43C44DF95B}" type="datetimeFigureOut">
               <a:rPr lang="de-DE" smtClean="0"/>
-              <a:t>01.10.2017</a:t>
+              <a:t>10.10.2017</a:t>
             </a:fld>
             <a:endParaRPr lang="de-DE"/>
           </a:p>
@@ -4708,11 +4709,7 @@
           <a:p>
             <a:r>
               <a:rPr lang="de-DE" sz="2800" smtClean="0"/>
-              <a:t>H =</a:t>
-            </a:r>
-            <a:r>
-              <a:rPr lang="de-DE" sz="2800" smtClean="0"/>
-              <a:t> H</a:t>
+              <a:t>H = H</a:t>
             </a:r>
             <a:r>
               <a:rPr lang="de-DE" sz="2800" baseline="-25000" smtClean="0"/>
@@ -6452,6 +6449,954 @@
     <p:extLst>
       <p:ext uri="{BB962C8B-B14F-4D97-AF65-F5344CB8AC3E}">
         <p14:creationId xmlns:p14="http://schemas.microsoft.com/office/powerpoint/2010/main" val="351074495"/>
+      </p:ext>
+    </p:extLst>
+  </p:cSld>
+  <p:clrMapOvr>
+    <a:masterClrMapping/>
+  </p:clrMapOvr>
+</p:sld>
+</file>
+
+<file path=ppt/slides/slide12.xml><?xml version="1.0" encoding="utf-8"?>
+<p:sld xmlns:a="http://schemas.openxmlformats.org/drawingml/2006/main" xmlns:r="http://schemas.openxmlformats.org/officeDocument/2006/relationships" xmlns:p="http://schemas.openxmlformats.org/presentationml/2006/main">
+  <p:cSld>
+    <p:spTree>
+      <p:nvGrpSpPr>
+        <p:cNvPr id="1" name=""/>
+        <p:cNvGrpSpPr/>
+        <p:nvPr/>
+      </p:nvGrpSpPr>
+      <p:grpSpPr>
+        <a:xfrm>
+          <a:off x="0" y="0"/>
+          <a:ext cx="0" cy="0"/>
+          <a:chOff x="0" y="0"/>
+          <a:chExt cx="0" cy="0"/>
+        </a:xfrm>
+      </p:grpSpPr>
+      <p:sp>
+        <p:nvSpPr>
+          <p:cNvPr id="32" name="Titel 1"/>
+          <p:cNvSpPr txBox="1">
+            <a:spLocks/>
+          </p:cNvSpPr>
+          <p:nvPr/>
+        </p:nvSpPr>
+        <p:spPr>
+          <a:xfrm>
+            <a:off x="1475656" y="625252"/>
+            <a:ext cx="3067117" cy="571500"/>
+          </a:xfrm>
+          <a:prstGeom prst="rect">
+            <a:avLst/>
+          </a:prstGeom>
+        </p:spPr>
+        <p:txBody>
+          <a:bodyPr vert="horz" lIns="91440" tIns="45720" rIns="91440" bIns="45720" rtlCol="0" anchor="ctr">
+            <a:noAutofit/>
+          </a:bodyPr>
+          <a:lstStyle>
+            <a:lvl1pPr algn="ctr" defTabSz="914400" rtl="0" eaLnBrk="1" latinLnBrk="0" hangingPunct="1">
+              <a:spcBef>
+                <a:spcPct val="0"/>
+              </a:spcBef>
+              <a:buNone/>
+              <a:defRPr sz="4400" kern="1200">
+                <a:solidFill>
+                  <a:schemeClr val="tx1"/>
+                </a:solidFill>
+                <a:latin typeface="+mj-lt"/>
+                <a:ea typeface="+mj-ea"/>
+                <a:cs typeface="+mj-cs"/>
+              </a:defRPr>
+            </a:lvl1pPr>
+          </a:lstStyle>
+          <a:p>
+            <a:r>
+              <a:rPr lang="de-DE" sz="2800" smtClean="0"/>
+              <a:t>H = </a:t>
+            </a:r>
+            <a:r>
+              <a:rPr lang="de-DE" sz="2800" smtClean="0"/>
+              <a:t>H</a:t>
+            </a:r>
+            <a:r>
+              <a:rPr lang="de-DE" sz="2800" baseline="-25000" smtClean="0"/>
+              <a:t>I</a:t>
+            </a:r>
+            <a:r>
+              <a:rPr lang="de-DE" sz="2800" smtClean="0"/>
+              <a:t>×H</a:t>
+            </a:r>
+            <a:r>
+              <a:rPr lang="de-DE" sz="2800" baseline="-25000" smtClean="0"/>
+              <a:t>II</a:t>
+            </a:r>
+            <a:r>
+              <a:rPr lang="de-DE" sz="2800" smtClean="0"/>
+              <a:t>×H</a:t>
+            </a:r>
+            <a:r>
+              <a:rPr lang="de-DE" sz="2800" baseline="-25000" smtClean="0"/>
+              <a:t>III</a:t>
+            </a:r>
+            <a:r>
+              <a:rPr lang="de-DE" sz="2800" smtClean="0"/>
+              <a:t> </a:t>
+            </a:r>
+            <a:endParaRPr lang="de-DE" sz="2800" dirty="0"/>
+          </a:p>
+        </p:txBody>
+      </p:sp>
+      <p:sp>
+        <p:nvSpPr>
+          <p:cNvPr id="5" name="Flussdiagramm: Verbindungsstelle 4"/>
+          <p:cNvSpPr/>
+          <p:nvPr/>
+        </p:nvSpPr>
+        <p:spPr>
+          <a:xfrm>
+            <a:off x="1547664" y="1557032"/>
+            <a:ext cx="2174482" cy="2160000"/>
+          </a:xfrm>
+          <a:prstGeom prst="flowChartConnector">
+            <a:avLst/>
+          </a:prstGeom>
+          <a:solidFill>
+            <a:schemeClr val="bg1"/>
+          </a:solidFill>
+        </p:spPr>
+        <p:style>
+          <a:lnRef idx="2">
+            <a:schemeClr val="accent1">
+              <a:shade val="50000"/>
+            </a:schemeClr>
+          </a:lnRef>
+          <a:fillRef idx="1">
+            <a:schemeClr val="accent1"/>
+          </a:fillRef>
+          <a:effectRef idx="0">
+            <a:schemeClr val="accent1"/>
+          </a:effectRef>
+          <a:fontRef idx="minor">
+            <a:schemeClr val="lt1"/>
+          </a:fontRef>
+        </p:style>
+        <p:txBody>
+          <a:bodyPr rtlCol="0" anchor="ctr"/>
+          <a:lstStyle/>
+          <a:p>
+            <a:pPr algn="ctr"/>
+            <a:r>
+              <a:rPr lang="de-DE" sz="2400" smtClean="0"/>
+              <a:t> </a:t>
+            </a:r>
+            <a:endParaRPr lang="de-DE" sz="2400"/>
+          </a:p>
+        </p:txBody>
+      </p:sp>
+      <p:sp>
+        <p:nvSpPr>
+          <p:cNvPr id="6" name="Kreis 5"/>
+          <p:cNvSpPr/>
+          <p:nvPr/>
+        </p:nvSpPr>
+        <p:spPr>
+          <a:xfrm>
+            <a:off x="1547664" y="1557032"/>
+            <a:ext cx="2174482" cy="2160000"/>
+          </a:xfrm>
+          <a:prstGeom prst="pie">
+            <a:avLst>
+              <a:gd name="adj1" fmla="val 5388994"/>
+              <a:gd name="adj2" fmla="val 16200000"/>
+            </a:avLst>
+          </a:prstGeom>
+        </p:spPr>
+        <p:style>
+          <a:lnRef idx="2">
+            <a:schemeClr val="accent1">
+              <a:shade val="50000"/>
+            </a:schemeClr>
+          </a:lnRef>
+          <a:fillRef idx="1">
+            <a:schemeClr val="accent1"/>
+          </a:fillRef>
+          <a:effectRef idx="0">
+            <a:schemeClr val="accent1"/>
+          </a:effectRef>
+          <a:fontRef idx="minor">
+            <a:schemeClr val="lt1"/>
+          </a:fontRef>
+        </p:style>
+        <p:txBody>
+          <a:bodyPr rtlCol="0" anchor="ctr"/>
+          <a:lstStyle/>
+          <a:p>
+            <a:pPr algn="ctr"/>
+            <a:endParaRPr lang="de-DE" sz="2400">
+              <a:solidFill>
+                <a:schemeClr val="tx1"/>
+              </a:solidFill>
+            </a:endParaRPr>
+          </a:p>
+        </p:txBody>
+      </p:sp>
+      <p:sp>
+        <p:nvSpPr>
+          <p:cNvPr id="8" name="Titel 1"/>
+          <p:cNvSpPr txBox="1">
+            <a:spLocks/>
+          </p:cNvSpPr>
+          <p:nvPr/>
+        </p:nvSpPr>
+        <p:spPr>
+          <a:xfrm>
+            <a:off x="1763688" y="1917071"/>
+            <a:ext cx="690111" cy="462857"/>
+          </a:xfrm>
+          <a:prstGeom prst="rect">
+            <a:avLst/>
+          </a:prstGeom>
+        </p:spPr>
+        <p:txBody>
+          <a:bodyPr vert="horz" lIns="91440" tIns="45720" rIns="91440" bIns="45720" rtlCol="0" anchor="ctr">
+            <a:noAutofit/>
+          </a:bodyPr>
+          <a:lstStyle>
+            <a:lvl1pPr algn="ctr" defTabSz="914400" rtl="0" eaLnBrk="1" latinLnBrk="0" hangingPunct="1">
+              <a:spcBef>
+                <a:spcPct val="0"/>
+              </a:spcBef>
+              <a:buNone/>
+              <a:defRPr sz="4400" kern="1200">
+                <a:solidFill>
+                  <a:schemeClr val="tx1"/>
+                </a:solidFill>
+                <a:latin typeface="+mj-lt"/>
+                <a:ea typeface="+mj-ea"/>
+                <a:cs typeface="+mj-cs"/>
+              </a:defRPr>
+            </a:lvl1pPr>
+          </a:lstStyle>
+          <a:p>
+            <a:pPr algn="r"/>
+            <a:r>
+              <a:rPr lang="de-DE" sz="2400" smtClean="0">
+                <a:solidFill>
+                  <a:schemeClr val="bg1"/>
+                </a:solidFill>
+              </a:rPr>
+              <a:t>H</a:t>
+            </a:r>
+            <a:r>
+              <a:rPr lang="de-DE" sz="2400" baseline="-25000" smtClean="0">
+                <a:solidFill>
+                  <a:schemeClr val="bg1"/>
+                </a:solidFill>
+              </a:rPr>
+              <a:t>I</a:t>
+            </a:r>
+            <a:endParaRPr lang="de-DE" sz="2400" baseline="-25000" dirty="0">
+              <a:solidFill>
+                <a:schemeClr val="bg1"/>
+              </a:solidFill>
+            </a:endParaRPr>
+          </a:p>
+        </p:txBody>
+      </p:sp>
+      <p:sp>
+        <p:nvSpPr>
+          <p:cNvPr id="37" name="Titel 1"/>
+          <p:cNvSpPr txBox="1">
+            <a:spLocks/>
+          </p:cNvSpPr>
+          <p:nvPr/>
+        </p:nvSpPr>
+        <p:spPr>
+          <a:xfrm>
+            <a:off x="2627784" y="2529138"/>
+            <a:ext cx="860371" cy="324037"/>
+          </a:xfrm>
+          <a:prstGeom prst="rect">
+            <a:avLst/>
+          </a:prstGeom>
+        </p:spPr>
+        <p:txBody>
+          <a:bodyPr vert="horz" lIns="91440" tIns="45720" rIns="91440" bIns="45720" rtlCol="0" anchor="ctr">
+            <a:noAutofit/>
+          </a:bodyPr>
+          <a:lstStyle>
+            <a:lvl1pPr algn="ctr" defTabSz="914400" rtl="0" eaLnBrk="1" latinLnBrk="0" hangingPunct="1">
+              <a:spcBef>
+                <a:spcPct val="0"/>
+              </a:spcBef>
+              <a:buNone/>
+              <a:defRPr sz="4400" kern="1200">
+                <a:solidFill>
+                  <a:schemeClr val="tx1"/>
+                </a:solidFill>
+                <a:latin typeface="+mj-lt"/>
+                <a:ea typeface="+mj-ea"/>
+                <a:cs typeface="+mj-cs"/>
+              </a:defRPr>
+            </a:lvl1pPr>
+          </a:lstStyle>
+          <a:p>
+            <a:pPr algn="r"/>
+            <a:r>
+              <a:rPr lang="de-DE" sz="2400" smtClean="0">
+                <a:solidFill>
+                  <a:schemeClr val="accent5">
+                    <a:lumMod val="75000"/>
+                  </a:schemeClr>
+                </a:solidFill>
+              </a:rPr>
+              <a:t>H</a:t>
+            </a:r>
+            <a:r>
+              <a:rPr lang="de-DE" sz="2400" baseline="-25000" smtClean="0">
+                <a:solidFill>
+                  <a:schemeClr val="accent5">
+                    <a:lumMod val="75000"/>
+                  </a:schemeClr>
+                </a:solidFill>
+              </a:rPr>
+              <a:t>III</a:t>
+            </a:r>
+            <a:endParaRPr lang="de-DE" sz="2400" baseline="-25000" dirty="0">
+              <a:solidFill>
+                <a:schemeClr val="accent5">
+                  <a:lumMod val="75000"/>
+                </a:schemeClr>
+              </a:solidFill>
+            </a:endParaRPr>
+          </a:p>
+        </p:txBody>
+      </p:sp>
+      <p:sp>
+        <p:nvSpPr>
+          <p:cNvPr id="51" name="Flussdiagramm: Verbindungsstelle 50"/>
+          <p:cNvSpPr/>
+          <p:nvPr/>
+        </p:nvSpPr>
+        <p:spPr>
+          <a:xfrm>
+            <a:off x="4845790" y="1268760"/>
+            <a:ext cx="2966570" cy="2880320"/>
+          </a:xfrm>
+          <a:prstGeom prst="flowChartConnector">
+            <a:avLst/>
+          </a:prstGeom>
+          <a:solidFill>
+            <a:schemeClr val="bg1"/>
+          </a:solidFill>
+        </p:spPr>
+        <p:style>
+          <a:lnRef idx="2">
+            <a:schemeClr val="accent1">
+              <a:shade val="50000"/>
+            </a:schemeClr>
+          </a:lnRef>
+          <a:fillRef idx="1">
+            <a:schemeClr val="accent1"/>
+          </a:fillRef>
+          <a:effectRef idx="0">
+            <a:schemeClr val="accent1"/>
+          </a:effectRef>
+          <a:fontRef idx="minor">
+            <a:schemeClr val="lt1"/>
+          </a:fontRef>
+        </p:style>
+        <p:txBody>
+          <a:bodyPr rtlCol="0" anchor="ctr"/>
+          <a:lstStyle/>
+          <a:p>
+            <a:pPr algn="ctr"/>
+            <a:r>
+              <a:rPr lang="de-DE" sz="2400" smtClean="0"/>
+              <a:t> </a:t>
+            </a:r>
+            <a:endParaRPr lang="de-DE" sz="2400"/>
+          </a:p>
+        </p:txBody>
+      </p:sp>
+      <p:sp>
+        <p:nvSpPr>
+          <p:cNvPr id="52" name="Kreis 51"/>
+          <p:cNvSpPr/>
+          <p:nvPr/>
+        </p:nvSpPr>
+        <p:spPr>
+          <a:xfrm>
+            <a:off x="4845790" y="1268760"/>
+            <a:ext cx="2966570" cy="2880320"/>
+          </a:xfrm>
+          <a:prstGeom prst="pie">
+            <a:avLst>
+              <a:gd name="adj1" fmla="val 5388994"/>
+              <a:gd name="adj2" fmla="val 16200000"/>
+            </a:avLst>
+          </a:prstGeom>
+        </p:spPr>
+        <p:style>
+          <a:lnRef idx="2">
+            <a:schemeClr val="accent1">
+              <a:shade val="50000"/>
+            </a:schemeClr>
+          </a:lnRef>
+          <a:fillRef idx="1">
+            <a:schemeClr val="accent1"/>
+          </a:fillRef>
+          <a:effectRef idx="0">
+            <a:schemeClr val="accent1"/>
+          </a:effectRef>
+          <a:fontRef idx="minor">
+            <a:schemeClr val="lt1"/>
+          </a:fontRef>
+        </p:style>
+        <p:txBody>
+          <a:bodyPr rtlCol="0" anchor="ctr"/>
+          <a:lstStyle/>
+          <a:p>
+            <a:pPr algn="ctr"/>
+            <a:endParaRPr lang="de-DE" sz="2400">
+              <a:solidFill>
+                <a:schemeClr val="tx1"/>
+              </a:solidFill>
+            </a:endParaRPr>
+          </a:p>
+        </p:txBody>
+      </p:sp>
+      <p:sp>
+        <p:nvSpPr>
+          <p:cNvPr id="53" name="Titel 1"/>
+          <p:cNvSpPr txBox="1">
+            <a:spLocks/>
+          </p:cNvSpPr>
+          <p:nvPr/>
+        </p:nvSpPr>
+        <p:spPr>
+          <a:xfrm>
+            <a:off x="4860032" y="3068960"/>
+            <a:ext cx="941494" cy="617211"/>
+          </a:xfrm>
+          <a:prstGeom prst="rect">
+            <a:avLst/>
+          </a:prstGeom>
+        </p:spPr>
+        <p:txBody>
+          <a:bodyPr vert="horz" lIns="91440" tIns="45720" rIns="91440" bIns="45720" rtlCol="0" anchor="ctr">
+            <a:noAutofit/>
+          </a:bodyPr>
+          <a:lstStyle>
+            <a:lvl1pPr algn="ctr" defTabSz="914400" rtl="0" eaLnBrk="1" latinLnBrk="0" hangingPunct="1">
+              <a:spcBef>
+                <a:spcPct val="0"/>
+              </a:spcBef>
+              <a:buNone/>
+              <a:defRPr sz="4400" kern="1200">
+                <a:solidFill>
+                  <a:schemeClr val="tx1"/>
+                </a:solidFill>
+                <a:latin typeface="+mj-lt"/>
+                <a:ea typeface="+mj-ea"/>
+                <a:cs typeface="+mj-cs"/>
+              </a:defRPr>
+            </a:lvl1pPr>
+          </a:lstStyle>
+          <a:p>
+            <a:pPr algn="r"/>
+            <a:r>
+              <a:rPr lang="de-DE" sz="2400" smtClean="0">
+                <a:solidFill>
+                  <a:schemeClr val="bg1"/>
+                </a:solidFill>
+              </a:rPr>
+              <a:t>H</a:t>
+            </a:r>
+            <a:r>
+              <a:rPr lang="de-DE" sz="2400" baseline="-25000" smtClean="0">
+                <a:solidFill>
+                  <a:schemeClr val="bg1"/>
+                </a:solidFill>
+              </a:rPr>
+              <a:t>IV</a:t>
+            </a:r>
+            <a:endParaRPr lang="de-DE" sz="2400" baseline="-25000" dirty="0">
+              <a:solidFill>
+                <a:schemeClr val="bg1"/>
+              </a:solidFill>
+            </a:endParaRPr>
+          </a:p>
+        </p:txBody>
+      </p:sp>
+      <p:sp>
+        <p:nvSpPr>
+          <p:cNvPr id="55" name="Titel 1"/>
+          <p:cNvSpPr txBox="1">
+            <a:spLocks/>
+          </p:cNvSpPr>
+          <p:nvPr/>
+        </p:nvSpPr>
+        <p:spPr>
+          <a:xfrm>
+            <a:off x="5925910" y="2853126"/>
+            <a:ext cx="1173774" cy="432097"/>
+          </a:xfrm>
+          <a:prstGeom prst="rect">
+            <a:avLst/>
+          </a:prstGeom>
+        </p:spPr>
+        <p:txBody>
+          <a:bodyPr vert="horz" lIns="91440" tIns="45720" rIns="91440" bIns="45720" rtlCol="0" anchor="ctr">
+            <a:noAutofit/>
+          </a:bodyPr>
+          <a:lstStyle>
+            <a:lvl1pPr algn="ctr" defTabSz="914400" rtl="0" eaLnBrk="1" latinLnBrk="0" hangingPunct="1">
+              <a:spcBef>
+                <a:spcPct val="0"/>
+              </a:spcBef>
+              <a:buNone/>
+              <a:defRPr sz="4400" kern="1200">
+                <a:solidFill>
+                  <a:schemeClr val="tx1"/>
+                </a:solidFill>
+                <a:latin typeface="+mj-lt"/>
+                <a:ea typeface="+mj-ea"/>
+                <a:cs typeface="+mj-cs"/>
+              </a:defRPr>
+            </a:lvl1pPr>
+          </a:lstStyle>
+          <a:p>
+            <a:pPr algn="r"/>
+            <a:r>
+              <a:rPr lang="de-DE" sz="2400" smtClean="0">
+                <a:solidFill>
+                  <a:schemeClr val="accent5">
+                    <a:lumMod val="75000"/>
+                  </a:schemeClr>
+                </a:solidFill>
+              </a:rPr>
+              <a:t>H</a:t>
+            </a:r>
+            <a:r>
+              <a:rPr lang="de-DE" sz="2400" baseline="-25000" smtClean="0">
+                <a:solidFill>
+                  <a:schemeClr val="accent5">
+                    <a:lumMod val="75000"/>
+                  </a:schemeClr>
+                </a:solidFill>
+              </a:rPr>
+              <a:t>V</a:t>
+            </a:r>
+            <a:endParaRPr lang="de-DE" sz="2400" baseline="-25000" dirty="0">
+              <a:solidFill>
+                <a:schemeClr val="accent5">
+                  <a:lumMod val="75000"/>
+                </a:schemeClr>
+              </a:solidFill>
+            </a:endParaRPr>
+          </a:p>
+        </p:txBody>
+      </p:sp>
+      <p:sp>
+        <p:nvSpPr>
+          <p:cNvPr id="7" name="Pfeil nach rechts 6"/>
+          <p:cNvSpPr/>
+          <p:nvPr/>
+        </p:nvSpPr>
+        <p:spPr>
+          <a:xfrm>
+            <a:off x="3808979" y="2421128"/>
+            <a:ext cx="933630" cy="576064"/>
+          </a:xfrm>
+          <a:prstGeom prst="rightArrow">
+            <a:avLst/>
+          </a:prstGeom>
+        </p:spPr>
+        <p:style>
+          <a:lnRef idx="2">
+            <a:schemeClr val="accent1">
+              <a:shade val="50000"/>
+            </a:schemeClr>
+          </a:lnRef>
+          <a:fillRef idx="1">
+            <a:schemeClr val="accent1"/>
+          </a:fillRef>
+          <a:effectRef idx="0">
+            <a:schemeClr val="accent1"/>
+          </a:effectRef>
+          <a:fontRef idx="minor">
+            <a:schemeClr val="lt1"/>
+          </a:fontRef>
+        </p:style>
+        <p:txBody>
+          <a:bodyPr rtlCol="0" anchor="ctr"/>
+          <a:lstStyle/>
+          <a:p>
+            <a:pPr algn="ctr"/>
+            <a:r>
+              <a:rPr lang="de-DE" smtClean="0"/>
+              <a:t>t</a:t>
+            </a:r>
+            <a:endParaRPr lang="de-DE" baseline="30000"/>
+          </a:p>
+        </p:txBody>
+      </p:sp>
+      <p:sp>
+        <p:nvSpPr>
+          <p:cNvPr id="61" name="Titel 1"/>
+          <p:cNvSpPr txBox="1">
+            <a:spLocks/>
+          </p:cNvSpPr>
+          <p:nvPr/>
+        </p:nvSpPr>
+        <p:spPr>
+          <a:xfrm>
+            <a:off x="4355976" y="620688"/>
+            <a:ext cx="3701635" cy="571500"/>
+          </a:xfrm>
+          <a:prstGeom prst="rect">
+            <a:avLst/>
+          </a:prstGeom>
+        </p:spPr>
+        <p:txBody>
+          <a:bodyPr vert="horz" lIns="91440" tIns="45720" rIns="91440" bIns="45720" rtlCol="0" anchor="ctr">
+            <a:noAutofit/>
+          </a:bodyPr>
+          <a:lstStyle>
+            <a:lvl1pPr algn="ctr" defTabSz="914400" rtl="0" eaLnBrk="1" latinLnBrk="0" hangingPunct="1">
+              <a:spcBef>
+                <a:spcPct val="0"/>
+              </a:spcBef>
+              <a:buNone/>
+              <a:defRPr sz="4400" kern="1200">
+                <a:solidFill>
+                  <a:schemeClr val="tx1"/>
+                </a:solidFill>
+                <a:latin typeface="+mj-lt"/>
+                <a:ea typeface="+mj-ea"/>
+                <a:cs typeface="+mj-cs"/>
+              </a:defRPr>
+            </a:lvl1pPr>
+          </a:lstStyle>
+          <a:p>
+            <a:r>
+              <a:rPr lang="de-DE" sz="2800" smtClean="0"/>
+              <a:t>H = </a:t>
+            </a:r>
+            <a:r>
+              <a:rPr lang="de-DE" sz="2800" smtClean="0"/>
+              <a:t>H</a:t>
+            </a:r>
+            <a:r>
+              <a:rPr lang="de-DE" sz="2800" baseline="-25000" smtClean="0"/>
+              <a:t>I</a:t>
+            </a:r>
+            <a:r>
+              <a:rPr lang="de-DE" sz="2800" smtClean="0"/>
+              <a:t>×H</a:t>
+            </a:r>
+            <a:r>
+              <a:rPr lang="de-DE" sz="2800" baseline="-25000" smtClean="0"/>
+              <a:t>II</a:t>
+            </a:r>
+            <a:r>
+              <a:rPr lang="de-DE" sz="2800" smtClean="0"/>
+              <a:t>×H</a:t>
+            </a:r>
+            <a:r>
+              <a:rPr lang="de-DE" sz="2800" baseline="-25000" smtClean="0"/>
+              <a:t>III</a:t>
+            </a:r>
+            <a:r>
+              <a:rPr lang="de-DE" sz="2800" smtClean="0"/>
+              <a:t>×H</a:t>
+            </a:r>
+            <a:r>
+              <a:rPr lang="de-DE" sz="2800" baseline="-25000" smtClean="0"/>
+              <a:t>IV</a:t>
+            </a:r>
+            <a:r>
+              <a:rPr lang="de-DE" sz="2800" smtClean="0"/>
+              <a:t>×H</a:t>
+            </a:r>
+            <a:r>
+              <a:rPr lang="de-DE" sz="2800" baseline="-25000" smtClean="0"/>
+              <a:t>V</a:t>
+            </a:r>
+            <a:r>
+              <a:rPr lang="de-DE" sz="2800" smtClean="0"/>
+              <a:t> </a:t>
+            </a:r>
+            <a:endParaRPr lang="de-DE" sz="2800" dirty="0"/>
+          </a:p>
+        </p:txBody>
+      </p:sp>
+      <p:sp>
+        <p:nvSpPr>
+          <p:cNvPr id="62" name="Titel 1"/>
+          <p:cNvSpPr txBox="1">
+            <a:spLocks/>
+          </p:cNvSpPr>
+          <p:nvPr/>
+        </p:nvSpPr>
+        <p:spPr>
+          <a:xfrm>
+            <a:off x="1793657" y="2750359"/>
+            <a:ext cx="690111" cy="462857"/>
+          </a:xfrm>
+          <a:prstGeom prst="rect">
+            <a:avLst/>
+          </a:prstGeom>
+        </p:spPr>
+        <p:txBody>
+          <a:bodyPr vert="horz" lIns="91440" tIns="45720" rIns="91440" bIns="45720" rtlCol="0" anchor="ctr">
+            <a:noAutofit/>
+          </a:bodyPr>
+          <a:lstStyle>
+            <a:lvl1pPr algn="ctr" defTabSz="914400" rtl="0" eaLnBrk="1" latinLnBrk="0" hangingPunct="1">
+              <a:spcBef>
+                <a:spcPct val="0"/>
+              </a:spcBef>
+              <a:buNone/>
+              <a:defRPr sz="4400" kern="1200">
+                <a:solidFill>
+                  <a:schemeClr val="tx1"/>
+                </a:solidFill>
+                <a:latin typeface="+mj-lt"/>
+                <a:ea typeface="+mj-ea"/>
+                <a:cs typeface="+mj-cs"/>
+              </a:defRPr>
+            </a:lvl1pPr>
+          </a:lstStyle>
+          <a:p>
+            <a:pPr algn="r"/>
+            <a:r>
+              <a:rPr lang="de-DE" sz="2400" smtClean="0">
+                <a:solidFill>
+                  <a:schemeClr val="bg1"/>
+                </a:solidFill>
+              </a:rPr>
+              <a:t>H</a:t>
+            </a:r>
+            <a:r>
+              <a:rPr lang="de-DE" sz="2400" baseline="-25000" smtClean="0">
+                <a:solidFill>
+                  <a:schemeClr val="bg1"/>
+                </a:solidFill>
+              </a:rPr>
+              <a:t>II</a:t>
+            </a:r>
+            <a:endParaRPr lang="de-DE" sz="2400" baseline="-25000" dirty="0">
+              <a:solidFill>
+                <a:schemeClr val="bg1"/>
+              </a:solidFill>
+            </a:endParaRPr>
+          </a:p>
+        </p:txBody>
+      </p:sp>
+      <p:sp>
+        <p:nvSpPr>
+          <p:cNvPr id="63" name="Titel 1"/>
+          <p:cNvSpPr txBox="1">
+            <a:spLocks/>
+          </p:cNvSpPr>
+          <p:nvPr/>
+        </p:nvSpPr>
+        <p:spPr>
+          <a:xfrm>
+            <a:off x="5364088" y="1700808"/>
+            <a:ext cx="690111" cy="462857"/>
+          </a:xfrm>
+          <a:prstGeom prst="rect">
+            <a:avLst/>
+          </a:prstGeom>
+        </p:spPr>
+        <p:txBody>
+          <a:bodyPr vert="horz" lIns="91440" tIns="45720" rIns="91440" bIns="45720" rtlCol="0" anchor="ctr">
+            <a:noAutofit/>
+          </a:bodyPr>
+          <a:lstStyle>
+            <a:lvl1pPr algn="ctr" defTabSz="914400" rtl="0" eaLnBrk="1" latinLnBrk="0" hangingPunct="1">
+              <a:spcBef>
+                <a:spcPct val="0"/>
+              </a:spcBef>
+              <a:buNone/>
+              <a:defRPr sz="4400" kern="1200">
+                <a:solidFill>
+                  <a:schemeClr val="tx1"/>
+                </a:solidFill>
+                <a:latin typeface="+mj-lt"/>
+                <a:ea typeface="+mj-ea"/>
+                <a:cs typeface="+mj-cs"/>
+              </a:defRPr>
+            </a:lvl1pPr>
+          </a:lstStyle>
+          <a:p>
+            <a:pPr algn="r"/>
+            <a:r>
+              <a:rPr lang="de-DE" sz="2400" smtClean="0">
+                <a:solidFill>
+                  <a:schemeClr val="bg1"/>
+                </a:solidFill>
+              </a:rPr>
+              <a:t>H</a:t>
+            </a:r>
+            <a:r>
+              <a:rPr lang="de-DE" sz="2400" baseline="-25000" smtClean="0">
+                <a:solidFill>
+                  <a:schemeClr val="bg1"/>
+                </a:solidFill>
+              </a:rPr>
+              <a:t>I</a:t>
+            </a:r>
+            <a:endParaRPr lang="de-DE" sz="2400" baseline="-25000" dirty="0">
+              <a:solidFill>
+                <a:schemeClr val="bg1"/>
+              </a:solidFill>
+            </a:endParaRPr>
+          </a:p>
+        </p:txBody>
+      </p:sp>
+      <p:sp>
+        <p:nvSpPr>
+          <p:cNvPr id="64" name="Titel 1"/>
+          <p:cNvSpPr txBox="1">
+            <a:spLocks/>
+          </p:cNvSpPr>
+          <p:nvPr/>
+        </p:nvSpPr>
+        <p:spPr>
+          <a:xfrm>
+            <a:off x="5394057" y="2534096"/>
+            <a:ext cx="690111" cy="462857"/>
+          </a:xfrm>
+          <a:prstGeom prst="rect">
+            <a:avLst/>
+          </a:prstGeom>
+        </p:spPr>
+        <p:txBody>
+          <a:bodyPr vert="horz" lIns="91440" tIns="45720" rIns="91440" bIns="45720" rtlCol="0" anchor="ctr">
+            <a:noAutofit/>
+          </a:bodyPr>
+          <a:lstStyle>
+            <a:lvl1pPr algn="ctr" defTabSz="914400" rtl="0" eaLnBrk="1" latinLnBrk="0" hangingPunct="1">
+              <a:spcBef>
+                <a:spcPct val="0"/>
+              </a:spcBef>
+              <a:buNone/>
+              <a:defRPr sz="4400" kern="1200">
+                <a:solidFill>
+                  <a:schemeClr val="tx1"/>
+                </a:solidFill>
+                <a:latin typeface="+mj-lt"/>
+                <a:ea typeface="+mj-ea"/>
+                <a:cs typeface="+mj-cs"/>
+              </a:defRPr>
+            </a:lvl1pPr>
+          </a:lstStyle>
+          <a:p>
+            <a:pPr algn="r"/>
+            <a:r>
+              <a:rPr lang="de-DE" sz="2400" smtClean="0">
+                <a:solidFill>
+                  <a:schemeClr val="bg1"/>
+                </a:solidFill>
+              </a:rPr>
+              <a:t>H</a:t>
+            </a:r>
+            <a:r>
+              <a:rPr lang="de-DE" sz="2400" baseline="-25000" smtClean="0">
+                <a:solidFill>
+                  <a:schemeClr val="bg1"/>
+                </a:solidFill>
+              </a:rPr>
+              <a:t>II</a:t>
+            </a:r>
+            <a:endParaRPr lang="de-DE" sz="2400" baseline="-25000" dirty="0">
+              <a:solidFill>
+                <a:schemeClr val="bg1"/>
+              </a:solidFill>
+            </a:endParaRPr>
+          </a:p>
+        </p:txBody>
+      </p:sp>
+      <p:sp>
+        <p:nvSpPr>
+          <p:cNvPr id="66" name="Titel 1"/>
+          <p:cNvSpPr txBox="1">
+            <a:spLocks/>
+          </p:cNvSpPr>
+          <p:nvPr/>
+        </p:nvSpPr>
+        <p:spPr>
+          <a:xfrm>
+            <a:off x="6444208" y="2204864"/>
+            <a:ext cx="860371" cy="324037"/>
+          </a:xfrm>
+          <a:prstGeom prst="rect">
+            <a:avLst/>
+          </a:prstGeom>
+        </p:spPr>
+        <p:txBody>
+          <a:bodyPr vert="horz" lIns="91440" tIns="45720" rIns="91440" bIns="45720" rtlCol="0" anchor="ctr">
+            <a:noAutofit/>
+          </a:bodyPr>
+          <a:lstStyle>
+            <a:lvl1pPr algn="ctr" defTabSz="914400" rtl="0" eaLnBrk="1" latinLnBrk="0" hangingPunct="1">
+              <a:spcBef>
+                <a:spcPct val="0"/>
+              </a:spcBef>
+              <a:buNone/>
+              <a:defRPr sz="4400" kern="1200">
+                <a:solidFill>
+                  <a:schemeClr val="tx1"/>
+                </a:solidFill>
+                <a:latin typeface="+mj-lt"/>
+                <a:ea typeface="+mj-ea"/>
+                <a:cs typeface="+mj-cs"/>
+              </a:defRPr>
+            </a:lvl1pPr>
+          </a:lstStyle>
+          <a:p>
+            <a:pPr algn="r"/>
+            <a:r>
+              <a:rPr lang="de-DE" sz="2400" smtClean="0">
+                <a:solidFill>
+                  <a:schemeClr val="accent5">
+                    <a:lumMod val="75000"/>
+                  </a:schemeClr>
+                </a:solidFill>
+              </a:rPr>
+              <a:t>H</a:t>
+            </a:r>
+            <a:r>
+              <a:rPr lang="de-DE" sz="2400" baseline="-25000" smtClean="0">
+                <a:solidFill>
+                  <a:schemeClr val="accent5">
+                    <a:lumMod val="75000"/>
+                  </a:schemeClr>
+                </a:solidFill>
+              </a:rPr>
+              <a:t>III</a:t>
+            </a:r>
+            <a:endParaRPr lang="de-DE" sz="2400" baseline="-25000" dirty="0">
+              <a:solidFill>
+                <a:schemeClr val="accent5">
+                  <a:lumMod val="75000"/>
+                </a:schemeClr>
+              </a:solidFill>
+            </a:endParaRPr>
+          </a:p>
+        </p:txBody>
+      </p:sp>
+    </p:spTree>
+    <p:extLst>
+      <p:ext uri="{BB962C8B-B14F-4D97-AF65-F5344CB8AC3E}">
+        <p14:creationId xmlns:p14="http://schemas.microsoft.com/office/powerpoint/2010/main" val="3420332831"/>
       </p:ext>
     </p:extLst>
   </p:cSld>

</xml_diff>

<commit_message>
alle Pfeile in den Hintergrund gestellt
</commit_message>
<xml_diff>
--- a/Physikalismus.pptx
+++ b/Physikalismus.pptx
@@ -301,7 +301,7 @@
           <a:p>
             <a:fld id="{8EAC6BE9-FF5B-4ADD-9934-8E43C44DF95B}" type="datetimeFigureOut">
               <a:rPr lang="de-DE" smtClean="0"/>
-              <a:t>05.03.2018</a:t>
+              <a:t>18.03.2018</a:t>
             </a:fld>
             <a:endParaRPr lang="de-DE"/>
           </a:p>
@@ -471,7 +471,7 @@
           <a:p>
             <a:fld id="{8EAC6BE9-FF5B-4ADD-9934-8E43C44DF95B}" type="datetimeFigureOut">
               <a:rPr lang="de-DE" smtClean="0"/>
-              <a:t>05.03.2018</a:t>
+              <a:t>18.03.2018</a:t>
             </a:fld>
             <a:endParaRPr lang="de-DE"/>
           </a:p>
@@ -651,7 +651,7 @@
           <a:p>
             <a:fld id="{8EAC6BE9-FF5B-4ADD-9934-8E43C44DF95B}" type="datetimeFigureOut">
               <a:rPr lang="de-DE" smtClean="0"/>
-              <a:t>05.03.2018</a:t>
+              <a:t>18.03.2018</a:t>
             </a:fld>
             <a:endParaRPr lang="de-DE"/>
           </a:p>
@@ -821,7 +821,7 @@
           <a:p>
             <a:fld id="{8EAC6BE9-FF5B-4ADD-9934-8E43C44DF95B}" type="datetimeFigureOut">
               <a:rPr lang="de-DE" smtClean="0"/>
-              <a:t>05.03.2018</a:t>
+              <a:t>18.03.2018</a:t>
             </a:fld>
             <a:endParaRPr lang="de-DE"/>
           </a:p>
@@ -1067,7 +1067,7 @@
           <a:p>
             <a:fld id="{8EAC6BE9-FF5B-4ADD-9934-8E43C44DF95B}" type="datetimeFigureOut">
               <a:rPr lang="de-DE" smtClean="0"/>
-              <a:t>05.03.2018</a:t>
+              <a:t>18.03.2018</a:t>
             </a:fld>
             <a:endParaRPr lang="de-DE"/>
           </a:p>
@@ -1355,7 +1355,7 @@
           <a:p>
             <a:fld id="{8EAC6BE9-FF5B-4ADD-9934-8E43C44DF95B}" type="datetimeFigureOut">
               <a:rPr lang="de-DE" smtClean="0"/>
-              <a:t>05.03.2018</a:t>
+              <a:t>18.03.2018</a:t>
             </a:fld>
             <a:endParaRPr lang="de-DE"/>
           </a:p>
@@ -1777,7 +1777,7 @@
           <a:p>
             <a:fld id="{8EAC6BE9-FF5B-4ADD-9934-8E43C44DF95B}" type="datetimeFigureOut">
               <a:rPr lang="de-DE" smtClean="0"/>
-              <a:t>05.03.2018</a:t>
+              <a:t>18.03.2018</a:t>
             </a:fld>
             <a:endParaRPr lang="de-DE"/>
           </a:p>
@@ -1895,7 +1895,7 @@
           <a:p>
             <a:fld id="{8EAC6BE9-FF5B-4ADD-9934-8E43C44DF95B}" type="datetimeFigureOut">
               <a:rPr lang="de-DE" smtClean="0"/>
-              <a:t>05.03.2018</a:t>
+              <a:t>18.03.2018</a:t>
             </a:fld>
             <a:endParaRPr lang="de-DE"/>
           </a:p>
@@ -1990,7 +1990,7 @@
           <a:p>
             <a:fld id="{8EAC6BE9-FF5B-4ADD-9934-8E43C44DF95B}" type="datetimeFigureOut">
               <a:rPr lang="de-DE" smtClean="0"/>
-              <a:t>05.03.2018</a:t>
+              <a:t>18.03.2018</a:t>
             </a:fld>
             <a:endParaRPr lang="de-DE"/>
           </a:p>
@@ -2267,7 +2267,7 @@
           <a:p>
             <a:fld id="{8EAC6BE9-FF5B-4ADD-9934-8E43C44DF95B}" type="datetimeFigureOut">
               <a:rPr lang="de-DE" smtClean="0"/>
-              <a:t>05.03.2018</a:t>
+              <a:t>18.03.2018</a:t>
             </a:fld>
             <a:endParaRPr lang="de-DE"/>
           </a:p>
@@ -2520,7 +2520,7 @@
           <a:p>
             <a:fld id="{8EAC6BE9-FF5B-4ADD-9934-8E43C44DF95B}" type="datetimeFigureOut">
               <a:rPr lang="de-DE" smtClean="0"/>
-              <a:t>05.03.2018</a:t>
+              <a:t>18.03.2018</a:t>
             </a:fld>
             <a:endParaRPr lang="de-DE"/>
           </a:p>
@@ -2733,7 +2733,7 @@
           <a:p>
             <a:fld id="{8EAC6BE9-FF5B-4ADD-9934-8E43C44DF95B}" type="datetimeFigureOut">
               <a:rPr lang="de-DE" smtClean="0"/>
-              <a:t>05.03.2018</a:t>
+              <a:t>18.03.2018</a:t>
             </a:fld>
             <a:endParaRPr lang="de-DE"/>
           </a:p>
@@ -8020,56 +8020,6 @@
           <a:chExt cx="0" cy="0"/>
         </a:xfrm>
       </p:grpSpPr>
-      <p:pic>
-        <p:nvPicPr>
-          <p:cNvPr id="1029" name="Picture 5" descr="F:\Harald\AppData\Local\Microsoft\Windows\Temporary Internet Files\Content.IE5\X156FA24\coordinates-150903_960_720[1].png"/>
-          <p:cNvPicPr>
-            <a:picLocks noChangeAspect="1" noChangeArrowheads="1"/>
-          </p:cNvPicPr>
-          <p:nvPr/>
-        </p:nvPicPr>
-        <p:blipFill>
-          <a:blip r:embed="rId2">
-            <a:extLst>
-              <a:ext uri="{BEBA8EAE-BF5A-486C-A8C5-ECC9F3942E4B}">
-                <a14:imgProps xmlns:a14="http://schemas.microsoft.com/office/drawing/2010/main">
-                  <a14:imgLayer r:embed="rId3">
-                    <a14:imgEffect>
-                      <a14:colorTemperature colorTemp="3875"/>
-                    </a14:imgEffect>
-                  </a14:imgLayer>
-                </a14:imgProps>
-              </a:ext>
-              <a:ext uri="{28A0092B-C50C-407E-A947-70E740481C1C}">
-                <a14:useLocalDpi xmlns:a14="http://schemas.microsoft.com/office/drawing/2010/main" val="0"/>
-              </a:ext>
-            </a:extLst>
-          </a:blip>
-          <a:srcRect/>
-          <a:stretch>
-            <a:fillRect/>
-          </a:stretch>
-        </p:blipFill>
-        <p:spPr bwMode="auto">
-          <a:xfrm>
-            <a:off x="323528" y="1660699"/>
-            <a:ext cx="3712517" cy="3712517"/>
-          </a:xfrm>
-          <a:prstGeom prst="rect">
-            <a:avLst/>
-          </a:prstGeom>
-          <a:noFill/>
-          <a:extLst>
-            <a:ext uri="{909E8E84-426E-40DD-AFC4-6F175D3DCCD1}">
-              <a14:hiddenFill xmlns:a14="http://schemas.microsoft.com/office/drawing/2010/main">
-                <a:solidFill>
-                  <a:srgbClr val="FFFFFF"/>
-                </a:solidFill>
-              </a14:hiddenFill>
-            </a:ext>
-          </a:extLst>
-        </p:spPr>
-      </p:pic>
       <p:grpSp>
         <p:nvGrpSpPr>
           <p:cNvPr id="24" name="Gruppieren 23"/>
@@ -8139,11 +8089,11 @@
             <p:nvPr/>
           </p:nvPicPr>
           <p:blipFill>
-            <a:blip r:embed="rId4" cstate="print">
+            <a:blip r:embed="rId2" cstate="print">
               <a:extLst>
                 <a:ext uri="{BEBA8EAE-BF5A-486C-A8C5-ECC9F3942E4B}">
                   <a14:imgProps xmlns:a14="http://schemas.microsoft.com/office/drawing/2010/main">
-                    <a14:imgLayer r:embed="rId5">
+                    <a14:imgLayer r:embed="rId3">
                       <a14:imgEffect>
                         <a14:colorTemperature colorTemp="11500"/>
                       </a14:imgEffect>
@@ -8253,11 +8203,11 @@
             <p:nvPr/>
           </p:nvPicPr>
           <p:blipFill>
-            <a:blip r:embed="rId6" cstate="print">
+            <a:blip r:embed="rId4" cstate="print">
               <a:extLst>
                 <a:ext uri="{BEBA8EAE-BF5A-486C-A8C5-ECC9F3942E4B}">
                   <a14:imgProps xmlns:a14="http://schemas.microsoft.com/office/drawing/2010/main">
-                    <a14:imgLayer r:embed="rId7">
+                    <a14:imgLayer r:embed="rId5">
                       <a14:imgEffect>
                         <a14:colorTemperature colorTemp="11500"/>
                       </a14:imgEffect>
@@ -8298,92 +8248,6 @@
           </p:spPr>
         </p:pic>
       </p:grpSp>
-      <p:sp>
-        <p:nvSpPr>
-          <p:cNvPr id="2" name="Freihandform 1"/>
-          <p:cNvSpPr/>
-          <p:nvPr/>
-        </p:nvSpPr>
-        <p:spPr>
-          <a:xfrm>
-            <a:off x="1537855" y="711385"/>
-            <a:ext cx="1122218" cy="1579714"/>
-          </a:xfrm>
-          <a:custGeom>
-            <a:avLst/>
-            <a:gdLst>
-              <a:gd name="connsiteX0" fmla="*/ 1122218 w 1122218"/>
-              <a:gd name="connsiteY0" fmla="*/ 1475804 h 1579714"/>
-              <a:gd name="connsiteX1" fmla="*/ 696190 w 1122218"/>
-              <a:gd name="connsiteY1" fmla="*/ 295 h 1579714"/>
-              <a:gd name="connsiteX2" fmla="*/ 0 w 1122218"/>
-              <a:gd name="connsiteY2" fmla="*/ 1579714 h 1579714"/>
-            </a:gdLst>
-            <a:ahLst/>
-            <a:cxnLst>
-              <a:cxn ang="0">
-                <a:pos x="connsiteX0" y="connsiteY0"/>
-              </a:cxn>
-              <a:cxn ang="0">
-                <a:pos x="connsiteX1" y="connsiteY1"/>
-              </a:cxn>
-              <a:cxn ang="0">
-                <a:pos x="connsiteX2" y="connsiteY2"/>
-              </a:cxn>
-            </a:cxnLst>
-            <a:rect l="l" t="t" r="r" b="b"/>
-            <a:pathLst>
-              <a:path w="1122218" h="1579714">
-                <a:moveTo>
-                  <a:pt x="1122218" y="1475804"/>
-                </a:moveTo>
-                <a:cubicBezTo>
-                  <a:pt x="1002722" y="729390"/>
-                  <a:pt x="883226" y="-17023"/>
-                  <a:pt x="696190" y="295"/>
-                </a:cubicBezTo>
-                <a:cubicBezTo>
-                  <a:pt x="509154" y="17613"/>
-                  <a:pt x="65809" y="1316477"/>
-                  <a:pt x="0" y="1579714"/>
-                </a:cubicBezTo>
-              </a:path>
-            </a:pathLst>
-          </a:custGeom>
-          <a:noFill/>
-          <a:ln w="38100" cap="rnd">
-            <a:solidFill>
-              <a:srgbClr val="00B050"/>
-            </a:solidFill>
-            <a:prstDash val="sysDot"/>
-            <a:tailEnd type="triangle" w="lg" len="lg"/>
-          </a:ln>
-        </p:spPr>
-        <p:style>
-          <a:lnRef idx="2">
-            <a:schemeClr val="accent1">
-              <a:shade val="50000"/>
-            </a:schemeClr>
-          </a:lnRef>
-          <a:fillRef idx="1">
-            <a:schemeClr val="accent1"/>
-          </a:fillRef>
-          <a:effectRef idx="0">
-            <a:schemeClr val="accent1"/>
-          </a:effectRef>
-          <a:fontRef idx="minor">
-            <a:schemeClr val="lt1"/>
-          </a:fontRef>
-        </p:style>
-        <p:txBody>
-          <a:bodyPr rtlCol="0" anchor="ctr"/>
-          <a:lstStyle/>
-          <a:p>
-            <a:pPr algn="ctr"/>
-            <a:endParaRPr lang="de-DE"/>
-          </a:p>
-        </p:txBody>
-      </p:sp>
       <p:grpSp>
         <p:nvGrpSpPr>
           <p:cNvPr id="3" name="Gruppieren 2"/>
@@ -8453,11 +8317,11 @@
             <p:nvPr/>
           </p:nvPicPr>
           <p:blipFill>
-            <a:blip r:embed="rId8" cstate="print">
+            <a:blip r:embed="rId6" cstate="print">
               <a:extLst>
                 <a:ext uri="{BEBA8EAE-BF5A-486C-A8C5-ECC9F3942E4B}">
                   <a14:imgProps xmlns:a14="http://schemas.microsoft.com/office/drawing/2010/main">
-                    <a14:imgLayer r:embed="rId9">
+                    <a14:imgLayer r:embed="rId7">
                       <a14:imgEffect>
                         <a14:colorTemperature colorTemp="11500"/>
                       </a14:imgEffect>
@@ -8567,11 +8431,11 @@
             <p:nvPr/>
           </p:nvPicPr>
           <p:blipFill>
-            <a:blip r:embed="rId10" cstate="print">
+            <a:blip r:embed="rId8" cstate="print">
               <a:extLst>
                 <a:ext uri="{BEBA8EAE-BF5A-486C-A8C5-ECC9F3942E4B}">
                   <a14:imgProps xmlns:a14="http://schemas.microsoft.com/office/drawing/2010/main">
-                    <a14:imgLayer r:embed="rId11">
+                    <a14:imgLayer r:embed="rId9">
                       <a14:imgEffect>
                         <a14:colorTemperature colorTemp="11500"/>
                       </a14:imgEffect>
@@ -8621,11 +8485,11 @@
           <p:nvPr/>
         </p:nvPicPr>
         <p:blipFill>
-          <a:blip r:embed="rId2">
+          <a:blip r:embed="rId10">
             <a:extLst>
               <a:ext uri="{BEBA8EAE-BF5A-486C-A8C5-ECC9F3942E4B}">
                 <a14:imgProps xmlns:a14="http://schemas.microsoft.com/office/drawing/2010/main">
-                  <a14:imgLayer r:embed="rId3">
+                  <a14:imgLayer r:embed="rId11">
                     <a14:imgEffect>
                       <a14:colorTemperature colorTemp="3875"/>
                     </a14:imgEffect>
@@ -8778,11 +8642,6 @@
               </a:rPr>
               <a:t>Prozess 1</a:t>
             </a:r>
-            <a:endParaRPr lang="de-DE" b="1">
-              <a:solidFill>
-                <a:srgbClr val="00B050"/>
-              </a:solidFill>
-            </a:endParaRPr>
           </a:p>
         </p:txBody>
       </p:sp>
@@ -8816,11 +8675,6 @@
               </a:rPr>
               <a:t>Prozess 1</a:t>
             </a:r>
-            <a:endParaRPr lang="de-DE" b="1">
-              <a:solidFill>
-                <a:srgbClr val="00B050"/>
-              </a:solidFill>
-            </a:endParaRPr>
           </a:p>
         </p:txBody>
       </p:sp>
@@ -8911,6 +8765,142 @@
               <a:t>?</a:t>
             </a:r>
             <a:endParaRPr lang="de-DE" sz="6600"/>
+          </a:p>
+        </p:txBody>
+      </p:sp>
+      <p:pic>
+        <p:nvPicPr>
+          <p:cNvPr id="1029" name="Picture 5" descr="F:\Harald\AppData\Local\Microsoft\Windows\Temporary Internet Files\Content.IE5\X156FA24\coordinates-150903_960_720[1].png"/>
+          <p:cNvPicPr>
+            <a:picLocks noChangeAspect="1" noChangeArrowheads="1"/>
+          </p:cNvPicPr>
+          <p:nvPr/>
+        </p:nvPicPr>
+        <p:blipFill>
+          <a:blip r:embed="rId10">
+            <a:extLst>
+              <a:ext uri="{BEBA8EAE-BF5A-486C-A8C5-ECC9F3942E4B}">
+                <a14:imgProps xmlns:a14="http://schemas.microsoft.com/office/drawing/2010/main">
+                  <a14:imgLayer r:embed="rId11">
+                    <a14:imgEffect>
+                      <a14:colorTemperature colorTemp="3875"/>
+                    </a14:imgEffect>
+                  </a14:imgLayer>
+                </a14:imgProps>
+              </a:ext>
+              <a:ext uri="{28A0092B-C50C-407E-A947-70E740481C1C}">
+                <a14:useLocalDpi xmlns:a14="http://schemas.microsoft.com/office/drawing/2010/main" val="0"/>
+              </a:ext>
+            </a:extLst>
+          </a:blip>
+          <a:srcRect/>
+          <a:stretch>
+            <a:fillRect/>
+          </a:stretch>
+        </p:blipFill>
+        <p:spPr bwMode="auto">
+          <a:xfrm>
+            <a:off x="323528" y="1660699"/>
+            <a:ext cx="3712517" cy="3712517"/>
+          </a:xfrm>
+          <a:prstGeom prst="rect">
+            <a:avLst/>
+          </a:prstGeom>
+          <a:noFill/>
+          <a:extLst>
+            <a:ext uri="{909E8E84-426E-40DD-AFC4-6F175D3DCCD1}">
+              <a14:hiddenFill xmlns:a14="http://schemas.microsoft.com/office/drawing/2010/main">
+                <a:solidFill>
+                  <a:srgbClr val="FFFFFF"/>
+                </a:solidFill>
+              </a14:hiddenFill>
+            </a:ext>
+          </a:extLst>
+        </p:spPr>
+      </p:pic>
+      <p:sp>
+        <p:nvSpPr>
+          <p:cNvPr id="2" name="Freihandform 1"/>
+          <p:cNvSpPr/>
+          <p:nvPr/>
+        </p:nvSpPr>
+        <p:spPr>
+          <a:xfrm>
+            <a:off x="1537855" y="711385"/>
+            <a:ext cx="1122218" cy="1579714"/>
+          </a:xfrm>
+          <a:custGeom>
+            <a:avLst/>
+            <a:gdLst>
+              <a:gd name="connsiteX0" fmla="*/ 1122218 w 1122218"/>
+              <a:gd name="connsiteY0" fmla="*/ 1475804 h 1579714"/>
+              <a:gd name="connsiteX1" fmla="*/ 696190 w 1122218"/>
+              <a:gd name="connsiteY1" fmla="*/ 295 h 1579714"/>
+              <a:gd name="connsiteX2" fmla="*/ 0 w 1122218"/>
+              <a:gd name="connsiteY2" fmla="*/ 1579714 h 1579714"/>
+            </a:gdLst>
+            <a:ahLst/>
+            <a:cxnLst>
+              <a:cxn ang="0">
+                <a:pos x="connsiteX0" y="connsiteY0"/>
+              </a:cxn>
+              <a:cxn ang="0">
+                <a:pos x="connsiteX1" y="connsiteY1"/>
+              </a:cxn>
+              <a:cxn ang="0">
+                <a:pos x="connsiteX2" y="connsiteY2"/>
+              </a:cxn>
+            </a:cxnLst>
+            <a:rect l="l" t="t" r="r" b="b"/>
+            <a:pathLst>
+              <a:path w="1122218" h="1579714">
+                <a:moveTo>
+                  <a:pt x="1122218" y="1475804"/>
+                </a:moveTo>
+                <a:cubicBezTo>
+                  <a:pt x="1002722" y="729390"/>
+                  <a:pt x="883226" y="-17023"/>
+                  <a:pt x="696190" y="295"/>
+                </a:cubicBezTo>
+                <a:cubicBezTo>
+                  <a:pt x="509154" y="17613"/>
+                  <a:pt x="65809" y="1316477"/>
+                  <a:pt x="0" y="1579714"/>
+                </a:cubicBezTo>
+              </a:path>
+            </a:pathLst>
+          </a:custGeom>
+          <a:noFill/>
+          <a:ln w="38100" cap="rnd">
+            <a:solidFill>
+              <a:srgbClr val="00B050"/>
+            </a:solidFill>
+            <a:prstDash val="sysDot"/>
+            <a:tailEnd type="triangle" w="lg" len="lg"/>
+          </a:ln>
+        </p:spPr>
+        <p:style>
+          <a:lnRef idx="2">
+            <a:schemeClr val="accent1">
+              <a:shade val="50000"/>
+            </a:schemeClr>
+          </a:lnRef>
+          <a:fillRef idx="1">
+            <a:schemeClr val="accent1"/>
+          </a:fillRef>
+          <a:effectRef idx="0">
+            <a:schemeClr val="accent1"/>
+          </a:effectRef>
+          <a:fontRef idx="minor">
+            <a:schemeClr val="lt1"/>
+          </a:fontRef>
+        </p:style>
+        <p:txBody>
+          <a:bodyPr rtlCol="0" anchor="ctr"/>
+          <a:lstStyle/>
+          <a:p>
+            <a:pPr algn="ctr"/>
+            <a:endParaRPr lang="de-DE"/>
           </a:p>
         </p:txBody>
       </p:sp>

</xml_diff>